<commit_message>
devise and foundation slides
</commit_message>
<xml_diff>
--- a/Presentation.pptx
+++ b/Presentation.pptx
@@ -120,6 +120,11 @@
       </a:defRPr>
     </a:lvl9pPr>
   </p:defaultTextStyle>
+  <p:extLst>
+    <p:ext uri="{EFAFB233-063F-42B5-8137-9DF3F51BA10A}">
+      <p15:sldGuideLst xmlns:p15="http://schemas.microsoft.com/office/powerpoint/2012/main"/>
+    </p:ext>
+  </p:extLst>
 </p:presentation>
 </file>
 
@@ -6494,26 +6499,28 @@
         </p:nvSpPr>
         <p:spPr/>
         <p:txBody>
-          <a:bodyPr/>
-          <a:lstStyle/>
-          <a:p>
-            <a:r>
-              <a:rPr lang="en-US" dirty="0" smtClean="0"/>
+          <a:bodyPr>
+            <a:normAutofit/>
+          </a:bodyPr>
+          <a:lstStyle/>
+          <a:p>
+            <a:r>
+              <a:rPr lang="en-US" sz="4000" dirty="0" smtClean="0"/>
               <a:t>Program Details</a:t>
             </a:r>
           </a:p>
           <a:p>
             <a:r>
-              <a:rPr lang="en-US" dirty="0" smtClean="0"/>
+              <a:rPr lang="en-US" sz="4000" dirty="0" smtClean="0"/>
               <a:t>Day 1 – Implementer Side</a:t>
             </a:r>
           </a:p>
           <a:p>
             <a:r>
-              <a:rPr lang="en-US" dirty="0" smtClean="0"/>
+              <a:rPr lang="en-US" sz="4000" dirty="0" smtClean="0"/>
               <a:t>Day 2 – Client Side &amp; Demo</a:t>
             </a:r>
-            <a:endParaRPr lang="en-US" dirty="0"/>
+            <a:endParaRPr lang="en-US" sz="4000" dirty="0"/>
           </a:p>
         </p:txBody>
       </p:sp>
@@ -6657,60 +6664,67 @@
             <p:ph idx="1"/>
           </p:nvPr>
         </p:nvSpPr>
-        <p:spPr/>
-        <p:txBody>
-          <a:bodyPr/>
-          <a:lstStyle/>
-          <a:p>
-            <a:r>
-              <a:rPr lang="en-US" dirty="0" smtClean="0"/>
+        <p:spPr>
+          <a:xfrm>
+            <a:off x="1120000" y="1825625"/>
+            <a:ext cx="10233800" cy="4588054"/>
+          </a:xfrm>
+        </p:spPr>
+        <p:txBody>
+          <a:bodyPr>
+            <a:noAutofit/>
+          </a:bodyPr>
+          <a:lstStyle/>
+          <a:p>
+            <a:r>
+              <a:rPr lang="en-US" sz="4000" dirty="0" smtClean="0"/>
               <a:t>Technologies</a:t>
             </a:r>
-            <a:endParaRPr lang="en-US" dirty="0"/>
+            <a:endParaRPr lang="en-US" sz="4000" dirty="0"/>
           </a:p>
           <a:p>
             <a:pPr lvl="1"/>
             <a:r>
-              <a:rPr lang="en-US" dirty="0"/>
+              <a:rPr lang="en-US" sz="4000" dirty="0"/>
               <a:t>Ruby on Rails</a:t>
             </a:r>
           </a:p>
           <a:p>
             <a:pPr lvl="1"/>
             <a:r>
-              <a:rPr lang="en-US" dirty="0"/>
+              <a:rPr lang="en-US" sz="4000" dirty="0"/>
               <a:t>Foundation</a:t>
             </a:r>
           </a:p>
           <a:p>
             <a:pPr lvl="1"/>
             <a:r>
-              <a:rPr lang="en-US" dirty="0"/>
+              <a:rPr lang="en-US" sz="4000" dirty="0"/>
               <a:t>Devise</a:t>
             </a:r>
           </a:p>
           <a:p>
             <a:pPr lvl="1"/>
             <a:r>
-              <a:rPr lang="en-US" dirty="0" err="1"/>
+              <a:rPr lang="en-US" sz="4000" dirty="0" err="1"/>
               <a:t>ChartKick</a:t>
             </a:r>
-            <a:endParaRPr lang="en-US" dirty="0"/>
+            <a:endParaRPr lang="en-US" sz="4000" dirty="0"/>
           </a:p>
           <a:p>
             <a:pPr lvl="1"/>
             <a:r>
-              <a:rPr lang="en-US" dirty="0" err="1"/>
+              <a:rPr lang="en-US" sz="4000" dirty="0" err="1"/>
               <a:t>SimpleCalendar</a:t>
             </a:r>
-            <a:endParaRPr lang="en-US" dirty="0"/>
-          </a:p>
-          <a:p>
-            <a:r>
-              <a:rPr lang="en-US" dirty="0" smtClean="0"/>
+            <a:endParaRPr lang="en-US" sz="4000" dirty="0"/>
+          </a:p>
+          <a:p>
+            <a:r>
+              <a:rPr lang="en-US" sz="4000" dirty="0" smtClean="0"/>
               <a:t>Models</a:t>
             </a:r>
-            <a:endParaRPr lang="en-US" dirty="0"/>
+            <a:endParaRPr lang="en-US" sz="4000" dirty="0"/>
           </a:p>
         </p:txBody>
       </p:sp>
@@ -6759,6 +6773,7 @@
           <a:bodyPr/>
           <a:lstStyle/>
           <a:p>
+            <a:pPr algn="ctr"/>
             <a:r>
               <a:rPr lang="en-US" dirty="0" smtClean="0"/>
               <a:t>Ruby on Rails &amp; Foundation</a:t>
@@ -6767,25 +6782,288 @@
           </a:p>
         </p:txBody>
       </p:sp>
-      <p:sp>
-        <p:nvSpPr>
-          <p:cNvPr id="3" name="Content Placeholder 2"/>
-          <p:cNvSpPr>
-            <a:spLocks noGrp="1"/>
-          </p:cNvSpPr>
-          <p:nvPr>
-            <p:ph idx="1"/>
-          </p:nvPr>
-        </p:nvSpPr>
-        <p:spPr/>
-        <p:txBody>
-          <a:bodyPr/>
-          <a:lstStyle/>
-          <a:p>
-            <a:endParaRPr lang="en-US" dirty="0"/>
-          </a:p>
-        </p:txBody>
-      </p:sp>
+      <p:graphicFrame>
+        <p:nvGraphicFramePr>
+          <p:cNvPr id="6" name="Table 5"/>
+          <p:cNvGraphicFramePr>
+            <a:graphicFrameLocks noGrp="1"/>
+          </p:cNvGraphicFramePr>
+          <p:nvPr>
+            <p:extLst>
+              <p:ext uri="{D42A27DB-BD31-4B8C-83A1-F6EECF244321}">
+                <p14:modId xmlns:p14="http://schemas.microsoft.com/office/powerpoint/2010/main" val="1351556453"/>
+              </p:ext>
+            </p:extLst>
+          </p:nvPr>
+        </p:nvGraphicFramePr>
+        <p:xfrm>
+          <a:off x="2157132" y="1690688"/>
+          <a:ext cx="8128000" cy="1708617"/>
+        </p:xfrm>
+        <a:graphic>
+          <a:graphicData uri="http://schemas.openxmlformats.org/drawingml/2006/table">
+            <a:tbl>
+              <a:tblPr firstRow="1" bandRow="1">
+                <a:tableStyleId>{073A0DAA-6AF3-43AB-8588-CEC1D06C72B9}</a:tableStyleId>
+              </a:tblPr>
+              <a:tblGrid>
+                <a:gridCol w="8128000"/>
+              </a:tblGrid>
+              <a:tr h="1708617">
+                <a:tc>
+                  <a:txBody>
+                    <a:bodyPr/>
+                    <a:lstStyle/>
+                    <a:p>
+                      <a:r>
+                        <a:rPr lang="en-US" dirty="0" smtClean="0">
+                          <a:solidFill>
+                            <a:schemeClr val="accent4"/>
+                          </a:solidFill>
+                          <a:latin typeface="Monaco" charset="0"/>
+                          <a:ea typeface="Monaco" charset="0"/>
+                          <a:cs typeface="Monaco" charset="0"/>
+                        </a:rPr>
+                        <a:t>$ rails new </a:t>
+                      </a:r>
+                      <a:r>
+                        <a:rPr lang="en-US" dirty="0" err="1" smtClean="0">
+                          <a:solidFill>
+                            <a:schemeClr val="accent4"/>
+                          </a:solidFill>
+                          <a:latin typeface="Monaco" charset="0"/>
+                          <a:ea typeface="Monaco" charset="0"/>
+                          <a:cs typeface="Monaco" charset="0"/>
+                        </a:rPr>
+                        <a:t>fitness_tracker</a:t>
+                      </a:r>
+                      <a:endParaRPr lang="en-US" dirty="0" smtClean="0">
+                        <a:solidFill>
+                          <a:schemeClr val="accent4"/>
+                        </a:solidFill>
+                        <a:latin typeface="Monaco" charset="0"/>
+                        <a:ea typeface="Monaco" charset="0"/>
+                        <a:cs typeface="Monaco" charset="0"/>
+                      </a:endParaRPr>
+                    </a:p>
+                    <a:p>
+                      <a:r>
+                        <a:rPr lang="en-US" dirty="0" smtClean="0">
+                          <a:solidFill>
+                            <a:schemeClr val="accent4"/>
+                          </a:solidFill>
+                          <a:latin typeface="Monaco" charset="0"/>
+                          <a:ea typeface="Monaco" charset="0"/>
+                          <a:cs typeface="Monaco" charset="0"/>
+                        </a:rPr>
+                        <a:t>$</a:t>
+                      </a:r>
+                      <a:r>
+                        <a:rPr lang="en-US" baseline="0" dirty="0" smtClean="0">
+                          <a:solidFill>
+                            <a:schemeClr val="accent4"/>
+                          </a:solidFill>
+                          <a:latin typeface="Monaco" charset="0"/>
+                          <a:ea typeface="Monaco" charset="0"/>
+                          <a:cs typeface="Monaco" charset="0"/>
+                        </a:rPr>
+                        <a:t> cd </a:t>
+                      </a:r>
+                      <a:r>
+                        <a:rPr lang="en-US" baseline="0" dirty="0" err="1" smtClean="0">
+                          <a:solidFill>
+                            <a:schemeClr val="accent4"/>
+                          </a:solidFill>
+                          <a:latin typeface="Monaco" charset="0"/>
+                          <a:ea typeface="Monaco" charset="0"/>
+                          <a:cs typeface="Monaco" charset="0"/>
+                        </a:rPr>
+                        <a:t>fitness_tracker</a:t>
+                      </a:r>
+                      <a:endParaRPr lang="en-US" baseline="0" dirty="0" smtClean="0">
+                        <a:solidFill>
+                          <a:schemeClr val="accent4"/>
+                        </a:solidFill>
+                        <a:latin typeface="Monaco" charset="0"/>
+                        <a:ea typeface="Monaco" charset="0"/>
+                        <a:cs typeface="Monaco" charset="0"/>
+                      </a:endParaRPr>
+                    </a:p>
+                    <a:p>
+                      <a:r>
+                        <a:rPr lang="en-US" baseline="0" dirty="0" smtClean="0">
+                          <a:solidFill>
+                            <a:schemeClr val="accent4"/>
+                          </a:solidFill>
+                          <a:latin typeface="Monaco" charset="0"/>
+                          <a:ea typeface="Monaco" charset="0"/>
+                          <a:cs typeface="Monaco" charset="0"/>
+                        </a:rPr>
+                        <a:t>$ echo “gem ‘foundation-rails’ &gt;&gt; </a:t>
+                      </a:r>
+                      <a:r>
+                        <a:rPr lang="en-US" baseline="0" dirty="0" err="1" smtClean="0">
+                          <a:solidFill>
+                            <a:schemeClr val="accent4"/>
+                          </a:solidFill>
+                          <a:latin typeface="Monaco" charset="0"/>
+                          <a:ea typeface="Monaco" charset="0"/>
+                          <a:cs typeface="Monaco" charset="0"/>
+                        </a:rPr>
+                        <a:t>Gemfile</a:t>
+                      </a:r>
+                      <a:endParaRPr lang="en-US" baseline="0" dirty="0" smtClean="0">
+                        <a:solidFill>
+                          <a:schemeClr val="accent4"/>
+                        </a:solidFill>
+                        <a:latin typeface="Monaco" charset="0"/>
+                        <a:ea typeface="Monaco" charset="0"/>
+                        <a:cs typeface="Monaco" charset="0"/>
+                      </a:endParaRPr>
+                    </a:p>
+                    <a:p>
+                      <a:r>
+                        <a:rPr lang="en-US" baseline="0" dirty="0" smtClean="0">
+                          <a:solidFill>
+                            <a:schemeClr val="accent4"/>
+                          </a:solidFill>
+                          <a:latin typeface="Monaco" charset="0"/>
+                          <a:ea typeface="Monaco" charset="0"/>
+                          <a:cs typeface="Monaco" charset="0"/>
+                        </a:rPr>
+                        <a:t>$ bundle install</a:t>
+                      </a:r>
+                    </a:p>
+                    <a:p>
+                      <a:r>
+                        <a:rPr lang="en-US" baseline="0" dirty="0" smtClean="0">
+                          <a:solidFill>
+                            <a:schemeClr val="accent4"/>
+                          </a:solidFill>
+                          <a:latin typeface="Monaco" charset="0"/>
+                          <a:ea typeface="Monaco" charset="0"/>
+                          <a:cs typeface="Monaco" charset="0"/>
+                        </a:rPr>
+                        <a:t>$ rails g </a:t>
+                      </a:r>
+                      <a:r>
+                        <a:rPr lang="en-US" baseline="0" dirty="0" err="1" smtClean="0">
+                          <a:solidFill>
+                            <a:schemeClr val="accent4"/>
+                          </a:solidFill>
+                          <a:latin typeface="Monaco" charset="0"/>
+                          <a:ea typeface="Monaco" charset="0"/>
+                          <a:cs typeface="Monaco" charset="0"/>
+                        </a:rPr>
+                        <a:t>foundation:install</a:t>
+                      </a:r>
+                      <a:endParaRPr lang="en-US" dirty="0" smtClean="0">
+                        <a:solidFill>
+                          <a:schemeClr val="accent4"/>
+                        </a:solidFill>
+                        <a:latin typeface="Monaco" charset="0"/>
+                        <a:ea typeface="Monaco" charset="0"/>
+                        <a:cs typeface="Monaco" charset="0"/>
+                      </a:endParaRPr>
+                    </a:p>
+                  </a:txBody>
+                  <a:tcPr/>
+                </a:tc>
+              </a:tr>
+            </a:tbl>
+          </a:graphicData>
+        </a:graphic>
+      </p:graphicFrame>
+      <p:pic>
+        <p:nvPicPr>
+          <p:cNvPr id="7" name="Picture 6"/>
+          <p:cNvPicPr>
+            <a:picLocks noChangeAspect="1"/>
+          </p:cNvPicPr>
+          <p:nvPr/>
+        </p:nvPicPr>
+        <p:blipFill>
+          <a:blip r:embed="rId2">
+            <a:extLst>
+              <a:ext uri="{28A0092B-C50C-407E-A947-70E740481C1C}">
+                <a14:useLocalDpi xmlns:a14="http://schemas.microsoft.com/office/drawing/2010/main" val="0"/>
+              </a:ext>
+            </a:extLst>
+          </a:blip>
+          <a:stretch>
+            <a:fillRect/>
+          </a:stretch>
+        </p:blipFill>
+        <p:spPr>
+          <a:xfrm>
+            <a:off x="5163297" y="3909061"/>
+            <a:ext cx="1865405" cy="2414886"/>
+          </a:xfrm>
+          <a:prstGeom prst="rect">
+            <a:avLst/>
+          </a:prstGeom>
+        </p:spPr>
+      </p:pic>
+      <p:pic>
+        <p:nvPicPr>
+          <p:cNvPr id="8" name="Picture 7"/>
+          <p:cNvPicPr>
+            <a:picLocks noChangeAspect="1"/>
+          </p:cNvPicPr>
+          <p:nvPr/>
+        </p:nvPicPr>
+        <p:blipFill>
+          <a:blip r:embed="rId3">
+            <a:extLst>
+              <a:ext uri="{28A0092B-C50C-407E-A947-70E740481C1C}">
+                <a14:useLocalDpi xmlns:a14="http://schemas.microsoft.com/office/drawing/2010/main" val="0"/>
+              </a:ext>
+            </a:extLst>
+          </a:blip>
+          <a:stretch>
+            <a:fillRect/>
+          </a:stretch>
+        </p:blipFill>
+        <p:spPr>
+          <a:xfrm>
+            <a:off x="8473967" y="3909061"/>
+            <a:ext cx="1811165" cy="2414886"/>
+          </a:xfrm>
+          <a:prstGeom prst="rect">
+            <a:avLst/>
+          </a:prstGeom>
+        </p:spPr>
+      </p:pic>
+      <p:pic>
+        <p:nvPicPr>
+          <p:cNvPr id="9" name="Picture 8"/>
+          <p:cNvPicPr>
+            <a:picLocks noChangeAspect="1"/>
+          </p:cNvPicPr>
+          <p:nvPr/>
+        </p:nvPicPr>
+        <p:blipFill>
+          <a:blip r:embed="rId4">
+            <a:extLst>
+              <a:ext uri="{28A0092B-C50C-407E-A947-70E740481C1C}">
+                <a14:useLocalDpi xmlns:a14="http://schemas.microsoft.com/office/drawing/2010/main" val="0"/>
+              </a:ext>
+            </a:extLst>
+          </a:blip>
+          <a:stretch>
+            <a:fillRect/>
+          </a:stretch>
+        </p:blipFill>
+        <p:spPr>
+          <a:xfrm>
+            <a:off x="2157132" y="4426804"/>
+            <a:ext cx="1814981" cy="1576516"/>
+          </a:xfrm>
+          <a:prstGeom prst="rect">
+            <a:avLst/>
+          </a:prstGeom>
+        </p:spPr>
+      </p:pic>
     </p:spTree>
     <p:extLst>
       <p:ext uri="{BB962C8B-B14F-4D97-AF65-F5344CB8AC3E}">
@@ -6849,15 +7127,318 @@
             <p:ph idx="1"/>
           </p:nvPr>
         </p:nvSpPr>
-        <p:spPr/>
-        <p:txBody>
-          <a:bodyPr/>
-          <a:lstStyle/>
-          <a:p>
-            <a:endParaRPr lang="en-US"/>
-          </a:p>
-        </p:txBody>
-      </p:sp>
+        <p:spPr>
+          <a:xfrm>
+            <a:off x="1120000" y="1825624"/>
+            <a:ext cx="10233800" cy="4665327"/>
+          </a:xfrm>
+        </p:spPr>
+        <p:txBody>
+          <a:bodyPr/>
+          <a:lstStyle/>
+          <a:p>
+            <a:pPr marL="0" indent="0">
+              <a:buNone/>
+            </a:pPr>
+            <a:r>
+              <a:rPr lang="en-US" dirty="0" smtClean="0"/>
+              <a:t>Flexible authentication solution for Rails</a:t>
+            </a:r>
+          </a:p>
+          <a:p>
+            <a:pPr marL="0" indent="0">
+              <a:buNone/>
+            </a:pPr>
+            <a:endParaRPr lang="en-US" dirty="0"/>
+          </a:p>
+          <a:p>
+            <a:pPr marL="0" indent="0">
+              <a:buNone/>
+            </a:pPr>
+            <a:endParaRPr lang="en-US" dirty="0" smtClean="0"/>
+          </a:p>
+          <a:p>
+            <a:pPr marL="0" indent="0">
+              <a:buNone/>
+            </a:pPr>
+            <a:endParaRPr lang="en-US" dirty="0"/>
+          </a:p>
+          <a:p>
+            <a:pPr marL="0" indent="0">
+              <a:buNone/>
+            </a:pPr>
+            <a:endParaRPr lang="en-US" dirty="0" smtClean="0"/>
+          </a:p>
+          <a:p>
+            <a:r>
+              <a:rPr lang="en-US" dirty="0" smtClean="0"/>
+              <a:t>/users/</a:t>
+            </a:r>
+            <a:r>
+              <a:rPr lang="en-US" dirty="0" err="1" smtClean="0"/>
+              <a:t>sign_up</a:t>
+            </a:r>
+            <a:endParaRPr lang="en-US" dirty="0"/>
+          </a:p>
+          <a:p>
+            <a:r>
+              <a:rPr lang="en-US" dirty="0" smtClean="0"/>
+              <a:t>/users/</a:t>
+            </a:r>
+            <a:r>
+              <a:rPr lang="en-US" dirty="0" err="1" smtClean="0"/>
+              <a:t>sign_in</a:t>
+            </a:r>
+            <a:endParaRPr lang="en-US" dirty="0" smtClean="0"/>
+          </a:p>
+          <a:p>
+            <a:r>
+              <a:rPr lang="en-US" smtClean="0"/>
+              <a:t>Sessions</a:t>
+            </a:r>
+          </a:p>
+          <a:p>
+            <a:r>
+              <a:rPr lang="en-US" smtClean="0"/>
+              <a:t>Password encryption</a:t>
+            </a:r>
+          </a:p>
+          <a:p>
+            <a:endParaRPr lang="en-US" dirty="0" smtClean="0"/>
+          </a:p>
+          <a:p>
+            <a:pPr marL="0" indent="0">
+              <a:buNone/>
+            </a:pPr>
+            <a:endParaRPr lang="en-US" dirty="0"/>
+          </a:p>
+          <a:p>
+            <a:pPr marL="0" indent="0">
+              <a:buNone/>
+            </a:pPr>
+            <a:endParaRPr lang="en-US" dirty="0"/>
+          </a:p>
+        </p:txBody>
+      </p:sp>
+      <p:graphicFrame>
+        <p:nvGraphicFramePr>
+          <p:cNvPr id="4" name="Table 3"/>
+          <p:cNvGraphicFramePr>
+            <a:graphicFrameLocks noGrp="1"/>
+          </p:cNvGraphicFramePr>
+          <p:nvPr>
+            <p:extLst>
+              <p:ext uri="{D42A27DB-BD31-4B8C-83A1-F6EECF244321}">
+                <p14:modId xmlns:p14="http://schemas.microsoft.com/office/powerpoint/2010/main" val="804979882"/>
+              </p:ext>
+            </p:extLst>
+          </p:nvPr>
+        </p:nvGraphicFramePr>
+        <p:xfrm>
+          <a:off x="1120000" y="2384613"/>
+          <a:ext cx="8128000" cy="1864658"/>
+        </p:xfrm>
+        <a:graphic>
+          <a:graphicData uri="http://schemas.openxmlformats.org/drawingml/2006/table">
+            <a:tbl>
+              <a:tblPr firstRow="1" bandRow="1">
+                <a:tableStyleId>{073A0DAA-6AF3-43AB-8588-CEC1D06C72B9}</a:tableStyleId>
+              </a:tblPr>
+              <a:tblGrid>
+                <a:gridCol w="8128000"/>
+              </a:tblGrid>
+              <a:tr h="1864658">
+                <a:tc>
+                  <a:txBody>
+                    <a:bodyPr/>
+                    <a:lstStyle/>
+                    <a:p>
+                      <a:r>
+                        <a:rPr lang="en-US" dirty="0" smtClean="0">
+                          <a:solidFill>
+                            <a:schemeClr val="accent4"/>
+                          </a:solidFill>
+                          <a:latin typeface="Monaco" charset="0"/>
+                          <a:ea typeface="Monaco" charset="0"/>
+                          <a:cs typeface="Monaco" charset="0"/>
+                        </a:rPr>
+                        <a:t>$ gem </a:t>
+                      </a:r>
+                      <a:r>
+                        <a:rPr lang="en-US" sz="1800" b="1" kern="1200" dirty="0" smtClean="0">
+                          <a:solidFill>
+                            <a:schemeClr val="accent4"/>
+                          </a:solidFill>
+                          <a:effectLst/>
+                          <a:latin typeface="Monaco" charset="0"/>
+                          <a:ea typeface="Monaco" charset="0"/>
+                          <a:cs typeface="Monaco" charset="0"/>
+                        </a:rPr>
+                        <a:t>'devise’</a:t>
+                      </a:r>
+                    </a:p>
+                    <a:p>
+                      <a:r>
+                        <a:rPr lang="en-US" sz="1800" b="1" kern="1200" dirty="0" smtClean="0">
+                          <a:solidFill>
+                            <a:schemeClr val="accent4"/>
+                          </a:solidFill>
+                          <a:effectLst/>
+                          <a:latin typeface="Monaco" charset="0"/>
+                          <a:ea typeface="Monaco" charset="0"/>
+                          <a:cs typeface="Monaco" charset="0"/>
+                        </a:rPr>
+                        <a:t>$ bundle</a:t>
+                      </a:r>
+                      <a:r>
+                        <a:rPr lang="en-US" sz="1800" b="1" kern="1200" baseline="0" dirty="0" smtClean="0">
+                          <a:solidFill>
+                            <a:schemeClr val="accent4"/>
+                          </a:solidFill>
+                          <a:effectLst/>
+                          <a:latin typeface="Monaco" charset="0"/>
+                          <a:ea typeface="Monaco" charset="0"/>
+                          <a:cs typeface="Monaco" charset="0"/>
+                        </a:rPr>
+                        <a:t> install</a:t>
+                      </a:r>
+                      <a:endParaRPr lang="en-US" dirty="0" smtClean="0">
+                        <a:solidFill>
+                          <a:schemeClr val="accent4"/>
+                        </a:solidFill>
+                        <a:latin typeface="Monaco" charset="0"/>
+                        <a:ea typeface="Monaco" charset="0"/>
+                        <a:cs typeface="Monaco" charset="0"/>
+                      </a:endParaRPr>
+                    </a:p>
+                    <a:p>
+                      <a:r>
+                        <a:rPr lang="en-US" dirty="0" smtClean="0">
+                          <a:solidFill>
+                            <a:schemeClr val="accent4"/>
+                          </a:solidFill>
+                          <a:latin typeface="Monaco" charset="0"/>
+                          <a:ea typeface="Monaco" charset="0"/>
+                          <a:cs typeface="Monaco" charset="0"/>
+                        </a:rPr>
+                        <a:t>$ rails g </a:t>
+                      </a:r>
+                      <a:r>
+                        <a:rPr lang="en-US" dirty="0" err="1" smtClean="0">
+                          <a:solidFill>
+                            <a:schemeClr val="accent4"/>
+                          </a:solidFill>
+                          <a:latin typeface="Monaco" charset="0"/>
+                          <a:ea typeface="Monaco" charset="0"/>
+                          <a:cs typeface="Monaco" charset="0"/>
+                        </a:rPr>
+                        <a:t>devise:install</a:t>
+                      </a:r>
+                      <a:endParaRPr lang="en-US" dirty="0" smtClean="0">
+                        <a:solidFill>
+                          <a:schemeClr val="accent4"/>
+                        </a:solidFill>
+                        <a:latin typeface="Monaco" charset="0"/>
+                        <a:ea typeface="Monaco" charset="0"/>
+                        <a:cs typeface="Monaco" charset="0"/>
+                      </a:endParaRPr>
+                    </a:p>
+                    <a:p>
+                      <a:r>
+                        <a:rPr lang="en-US" dirty="0" smtClean="0">
+                          <a:solidFill>
+                            <a:schemeClr val="accent4"/>
+                          </a:solidFill>
+                          <a:latin typeface="Monaco" charset="0"/>
+                          <a:ea typeface="Monaco" charset="0"/>
+                          <a:cs typeface="Monaco" charset="0"/>
+                        </a:rPr>
+                        <a:t>$ rails g devise user</a:t>
+                      </a:r>
+                    </a:p>
+                    <a:p>
+                      <a:r>
+                        <a:rPr lang="en-US" dirty="0" smtClean="0">
+                          <a:solidFill>
+                            <a:schemeClr val="accent4"/>
+                          </a:solidFill>
+                          <a:latin typeface="Monaco" charset="0"/>
+                          <a:ea typeface="Monaco" charset="0"/>
+                          <a:cs typeface="Monaco" charset="0"/>
+                        </a:rPr>
+                        <a:t>$ rake </a:t>
+                      </a:r>
+                      <a:r>
+                        <a:rPr lang="en-US" dirty="0" err="1" smtClean="0">
+                          <a:solidFill>
+                            <a:schemeClr val="accent4"/>
+                          </a:solidFill>
+                          <a:latin typeface="Monaco" charset="0"/>
+                          <a:ea typeface="Monaco" charset="0"/>
+                          <a:cs typeface="Monaco" charset="0"/>
+                        </a:rPr>
+                        <a:t>db:migrate</a:t>
+                      </a:r>
+                      <a:endParaRPr lang="en-US" dirty="0" smtClean="0">
+                        <a:solidFill>
+                          <a:schemeClr val="accent4"/>
+                        </a:solidFill>
+                        <a:latin typeface="Monaco" charset="0"/>
+                        <a:ea typeface="Monaco" charset="0"/>
+                        <a:cs typeface="Monaco" charset="0"/>
+                      </a:endParaRPr>
+                    </a:p>
+                    <a:p>
+                      <a:r>
+                        <a:rPr lang="en-US" dirty="0" smtClean="0">
+                          <a:solidFill>
+                            <a:schemeClr val="accent4"/>
+                          </a:solidFill>
+                          <a:latin typeface="Monaco" charset="0"/>
+                          <a:ea typeface="Monaco" charset="0"/>
+                          <a:cs typeface="Monaco" charset="0"/>
+                        </a:rPr>
+                        <a:t>$</a:t>
+                      </a:r>
+                      <a:r>
+                        <a:rPr lang="en-US" baseline="0" dirty="0" smtClean="0">
+                          <a:solidFill>
+                            <a:schemeClr val="accent4"/>
+                          </a:solidFill>
+                          <a:latin typeface="Monaco" charset="0"/>
+                          <a:ea typeface="Monaco" charset="0"/>
+                          <a:cs typeface="Monaco" charset="0"/>
+                        </a:rPr>
+                        <a:t> rails g </a:t>
+                      </a:r>
+                      <a:r>
+                        <a:rPr lang="en-US" baseline="0" dirty="0" err="1" smtClean="0">
+                          <a:solidFill>
+                            <a:schemeClr val="accent4"/>
+                          </a:solidFill>
+                          <a:latin typeface="Monaco" charset="0"/>
+                          <a:ea typeface="Monaco" charset="0"/>
+                          <a:cs typeface="Monaco" charset="0"/>
+                        </a:rPr>
+                        <a:t>devise:views</a:t>
+                      </a:r>
+                      <a:endParaRPr lang="en-US" dirty="0">
+                        <a:solidFill>
+                          <a:schemeClr val="accent4"/>
+                        </a:solidFill>
+                        <a:latin typeface="Monaco" charset="0"/>
+                        <a:ea typeface="Monaco" charset="0"/>
+                        <a:cs typeface="Monaco" charset="0"/>
+                      </a:endParaRPr>
+                    </a:p>
+                  </a:txBody>
+                  <a:tcPr/>
+                </a:tc>
+              </a:tr>
+            </a:tbl>
+          </a:graphicData>
+        </a:graphic>
+      </p:graphicFrame>
     </p:spTree>
     <p:extLst>
       <p:ext uri="{BB962C8B-B14F-4D97-AF65-F5344CB8AC3E}">

</xml_diff>

<commit_message>
finished models added notes
</commit_message>
<xml_diff>
--- a/Presentation.pptx
+++ b/Presentation.pptx
@@ -4,6 +4,9 @@
   <p:sldMasterIdLst>
     <p:sldMasterId id="2147483648" r:id="rId1"/>
   </p:sldMasterIdLst>
+  <p:notesMasterIdLst>
+    <p:notesMasterId r:id="rId20"/>
+  </p:notesMasterIdLst>
   <p:sldIdLst>
     <p:sldId id="256" r:id="rId2"/>
     <p:sldId id="273" r:id="rId3"/>
@@ -1469,6 +1472,13 @@
         </dgm:presLayoutVars>
       </dgm:prSet>
       <dgm:spPr/>
+      <dgm:t>
+        <a:bodyPr/>
+        <a:lstStyle/>
+        <a:p>
+          <a:endParaRPr lang="en-US"/>
+        </a:p>
+      </dgm:t>
     </dgm:pt>
     <dgm:pt modelId="{CA9DF486-C3A0-6A42-AB8B-C73D9E3A417B}" type="pres">
       <dgm:prSet presAssocID="{46F6E394-227C-DB49-88BB-F8E3A97F298B}" presName="node" presStyleLbl="node1" presStyleIdx="0" presStyleCnt="3" custScaleY="119353" custRadScaleRad="82339">
@@ -1488,10 +1498,24 @@
     <dgm:pt modelId="{099C6AC5-F29A-BB4F-AAAE-42B5A3FF3498}" type="pres">
       <dgm:prSet presAssocID="{82B3FB4D-1A40-2A4F-86A2-EDA5E3E8CA95}" presName="sibTrans" presStyleLbl="sibTrans2D1" presStyleIdx="0" presStyleCnt="3" custAng="577954" custScaleX="84819" custLinFactNeighborX="5115"/>
       <dgm:spPr/>
+      <dgm:t>
+        <a:bodyPr/>
+        <a:lstStyle/>
+        <a:p>
+          <a:endParaRPr lang="en-US"/>
+        </a:p>
+      </dgm:t>
     </dgm:pt>
     <dgm:pt modelId="{5D018A5C-7647-7C48-8D70-F2604E096796}" type="pres">
       <dgm:prSet presAssocID="{82B3FB4D-1A40-2A4F-86A2-EDA5E3E8CA95}" presName="connectorText" presStyleLbl="sibTrans2D1" presStyleIdx="0" presStyleCnt="3"/>
       <dgm:spPr/>
+      <dgm:t>
+        <a:bodyPr/>
+        <a:lstStyle/>
+        <a:p>
+          <a:endParaRPr lang="en-US"/>
+        </a:p>
+      </dgm:t>
     </dgm:pt>
     <dgm:pt modelId="{BD424B58-7C4B-924F-A6D0-29AA3A6E0DA3}" type="pres">
       <dgm:prSet presAssocID="{C25DA871-9390-4F49-9165-FEA19EAEDAD6}" presName="node" presStyleLbl="node1" presStyleIdx="1" presStyleCnt="3" custScaleY="137330" custRadScaleRad="94542" custRadScaleInc="-9241">
@@ -1511,10 +1535,24 @@
     <dgm:pt modelId="{FFF6FBD4-145B-5049-B0D0-74F575A69218}" type="pres">
       <dgm:prSet presAssocID="{7D92888A-94E1-874F-99F4-AAD20F52308C}" presName="sibTrans" presStyleLbl="sibTrans2D1" presStyleIdx="1" presStyleCnt="3"/>
       <dgm:spPr/>
+      <dgm:t>
+        <a:bodyPr/>
+        <a:lstStyle/>
+        <a:p>
+          <a:endParaRPr lang="en-US"/>
+        </a:p>
+      </dgm:t>
     </dgm:pt>
     <dgm:pt modelId="{02EE73D7-6C71-5C46-B588-F2F53E7CFC1B}" type="pres">
       <dgm:prSet presAssocID="{7D92888A-94E1-874F-99F4-AAD20F52308C}" presName="connectorText" presStyleLbl="sibTrans2D1" presStyleIdx="1" presStyleCnt="3"/>
       <dgm:spPr/>
+      <dgm:t>
+        <a:bodyPr/>
+        <a:lstStyle/>
+        <a:p>
+          <a:endParaRPr lang="en-US"/>
+        </a:p>
+      </dgm:t>
     </dgm:pt>
     <dgm:pt modelId="{16D2087C-AD30-4D47-8459-3242BC07C7A4}" type="pres">
       <dgm:prSet presAssocID="{C21A54E0-F1A3-3448-91D3-28DB80ADDD60}" presName="node" presStyleLbl="node1" presStyleIdx="2" presStyleCnt="3" custScaleY="132997" custRadScaleRad="95488" custRadScaleInc="8477">
@@ -1545,46 +1583,53 @@
     <dgm:pt modelId="{00FAAA09-DE32-0E41-8978-A0DCD42450DC}" type="pres">
       <dgm:prSet presAssocID="{02D521BB-9D6E-AE4A-BF01-69904886C38E}" presName="connectorText" presStyleLbl="sibTrans2D1" presStyleIdx="2" presStyleCnt="3"/>
       <dgm:spPr/>
+      <dgm:t>
+        <a:bodyPr/>
+        <a:lstStyle/>
+        <a:p>
+          <a:endParaRPr lang="en-US"/>
+        </a:p>
+      </dgm:t>
     </dgm:pt>
   </dgm:ptLst>
   <dgm:cxnLst>
+    <dgm:cxn modelId="{D624FB87-6929-B546-A3A7-6B82A6F275FD}" srcId="{C25DA871-9390-4F49-9165-FEA19EAEDAD6}" destId="{A3033D2A-55D9-0240-A10C-D55687930357}" srcOrd="0" destOrd="0" parTransId="{5EF3D1CA-8285-D647-B6EE-FB3346FE218D}" sibTransId="{E91EE832-3B26-8B45-BF45-48D3DFC88AE2}"/>
+    <dgm:cxn modelId="{4EB942E7-73A7-B64D-92F5-57337AACB3BA}" srcId="{46F6E394-227C-DB49-88BB-F8E3A97F298B}" destId="{916ECD92-7A02-5E4B-ADEB-2918DC3CD55C}" srcOrd="1" destOrd="0" parTransId="{2FDBB221-967C-5E46-B7BA-7BD69CF9306B}" sibTransId="{FB9E940C-20CF-5244-8B00-E91442118B85}"/>
+    <dgm:cxn modelId="{3625FCE7-11BA-A843-93D5-25019BF39257}" type="presOf" srcId="{0E4D7888-19F2-0849-9455-EBC0BFA3DE79}" destId="{CA9DF486-C3A0-6A42-AB8B-C73D9E3A417B}" srcOrd="0" destOrd="4" presId="urn:microsoft.com/office/officeart/2005/8/layout/cycle7"/>
+    <dgm:cxn modelId="{CEB0D67F-B68E-0242-BC49-296A1B46B2DA}" type="presOf" srcId="{82B3FB4D-1A40-2A4F-86A2-EDA5E3E8CA95}" destId="{5D018A5C-7647-7C48-8D70-F2604E096796}" srcOrd="1" destOrd="0" presId="urn:microsoft.com/office/officeart/2005/8/layout/cycle7"/>
+    <dgm:cxn modelId="{897B152F-4DD1-4F4D-BA76-449C10A3BBE0}" srcId="{46F6E394-227C-DB49-88BB-F8E3A97F298B}" destId="{0E4D7888-19F2-0849-9455-EBC0BFA3DE79}" srcOrd="3" destOrd="0" parTransId="{64E7D98B-B57C-1941-8E75-7C7A70D6AAD0}" sibTransId="{A621D469-B865-BD4A-B8CC-C3A5B275A9EE}"/>
+    <dgm:cxn modelId="{A68F0551-CD66-054E-8101-EC9770A6396E}" srcId="{F1FDF8C5-3BF1-0148-A830-2AF5FA0F1929}" destId="{C21A54E0-F1A3-3448-91D3-28DB80ADDD60}" srcOrd="2" destOrd="0" parTransId="{21FC1A68-250C-E64B-ADB7-890AC9F32CBD}" sibTransId="{02D521BB-9D6E-AE4A-BF01-69904886C38E}"/>
+    <dgm:cxn modelId="{439095AF-8136-9C4A-8840-3E77BB3A4278}" srcId="{F1FDF8C5-3BF1-0148-A830-2AF5FA0F1929}" destId="{46F6E394-227C-DB49-88BB-F8E3A97F298B}" srcOrd="0" destOrd="0" parTransId="{952C1203-0623-5042-906A-DBADC6CC783C}" sibTransId="{82B3FB4D-1A40-2A4F-86A2-EDA5E3E8CA95}"/>
+    <dgm:cxn modelId="{EB06170F-F583-3F41-8477-669B6BAA3057}" type="presOf" srcId="{5476B833-8A93-7D4E-88B7-4D88C954B19C}" destId="{BD424B58-7C4B-924F-A6D0-29AA3A6E0DA3}" srcOrd="0" destOrd="4" presId="urn:microsoft.com/office/officeart/2005/8/layout/cycle7"/>
+    <dgm:cxn modelId="{C97623DE-A426-FF48-B163-84F9D2DA4F8B}" type="presOf" srcId="{02D521BB-9D6E-AE4A-BF01-69904886C38E}" destId="{00FAAA09-DE32-0E41-8978-A0DCD42450DC}" srcOrd="1" destOrd="0" presId="urn:microsoft.com/office/officeart/2005/8/layout/cycle7"/>
+    <dgm:cxn modelId="{610941E7-3531-E943-8531-89F033A6464D}" type="presOf" srcId="{82B3FB4D-1A40-2A4F-86A2-EDA5E3E8CA95}" destId="{099C6AC5-F29A-BB4F-AAAE-42B5A3FF3498}" srcOrd="0" destOrd="0" presId="urn:microsoft.com/office/officeart/2005/8/layout/cycle7"/>
+    <dgm:cxn modelId="{769EAF18-E7FC-EE4F-9381-ECB4F437283B}" type="presOf" srcId="{0F386312-2CC3-7141-84FA-87573BDAF383}" destId="{BD424B58-7C4B-924F-A6D0-29AA3A6E0DA3}" srcOrd="0" destOrd="2" presId="urn:microsoft.com/office/officeart/2005/8/layout/cycle7"/>
+    <dgm:cxn modelId="{BF865890-628E-3745-BE75-FB7EB6118BB3}" srcId="{C25DA871-9390-4F49-9165-FEA19EAEDAD6}" destId="{0F386312-2CC3-7141-84FA-87573BDAF383}" srcOrd="1" destOrd="0" parTransId="{852AE919-DE99-304D-9CEC-CA8EF5B1F0EF}" sibTransId="{824A92D6-B6C4-A441-B04B-9A22A44DDD83}"/>
+    <dgm:cxn modelId="{9C69C240-398A-9F49-AE2A-8957FABE77F2}" type="presOf" srcId="{916ECD92-7A02-5E4B-ADEB-2918DC3CD55C}" destId="{CA9DF486-C3A0-6A42-AB8B-C73D9E3A417B}" srcOrd="0" destOrd="2" presId="urn:microsoft.com/office/officeart/2005/8/layout/cycle7"/>
     <dgm:cxn modelId="{413AEA23-D6C8-D74C-B211-A27DFBC931F1}" type="presOf" srcId="{90BF0259-B653-D343-B3D9-53B2D661D792}" destId="{16D2087C-AD30-4D47-8459-3242BC07C7A4}" srcOrd="0" destOrd="3" presId="urn:microsoft.com/office/officeart/2005/8/layout/cycle7"/>
-    <dgm:cxn modelId="{3625FCE7-11BA-A843-93D5-25019BF39257}" type="presOf" srcId="{0E4D7888-19F2-0849-9455-EBC0BFA3DE79}" destId="{CA9DF486-C3A0-6A42-AB8B-C73D9E3A417B}" srcOrd="0" destOrd="4" presId="urn:microsoft.com/office/officeart/2005/8/layout/cycle7"/>
-    <dgm:cxn modelId="{77C7A835-51EE-3946-BB97-6FC628AB17BD}" type="presOf" srcId="{40C8740C-D20E-6849-9D81-EE1A7B382A5A}" destId="{CA9DF486-C3A0-6A42-AB8B-C73D9E3A417B}" srcOrd="0" destOrd="1" presId="urn:microsoft.com/office/officeart/2005/8/layout/cycle7"/>
-    <dgm:cxn modelId="{897B152F-4DD1-4F4D-BA76-449C10A3BBE0}" srcId="{46F6E394-227C-DB49-88BB-F8E3A97F298B}" destId="{0E4D7888-19F2-0849-9455-EBC0BFA3DE79}" srcOrd="3" destOrd="0" parTransId="{64E7D98B-B57C-1941-8E75-7C7A70D6AAD0}" sibTransId="{A621D469-B865-BD4A-B8CC-C3A5B275A9EE}"/>
+    <dgm:cxn modelId="{1BDD6A9D-7B2C-F147-8B93-9690C055E093}" srcId="{C21A54E0-F1A3-3448-91D3-28DB80ADDD60}" destId="{ECAEFA44-4957-DD4E-9EC7-3B8AFFE8F03D}" srcOrd="0" destOrd="0" parTransId="{2E56FF09-6D0A-A548-B846-6B17B91B1D79}" sibTransId="{B98F66F2-62A4-7A4F-A76A-AB5EBDE10157}"/>
+    <dgm:cxn modelId="{AE497691-12A0-644B-8A9B-7CD43475B532}" srcId="{46F6E394-227C-DB49-88BB-F8E3A97F298B}" destId="{40C8740C-D20E-6849-9D81-EE1A7B382A5A}" srcOrd="0" destOrd="0" parTransId="{156975FF-FC8F-BC42-907A-0999888B2E6C}" sibTransId="{70719985-FECE-2743-AFD3-F7A0E77DA067}"/>
+    <dgm:cxn modelId="{386C516A-E133-7B46-B3B4-681DD3A19749}" type="presOf" srcId="{C25DA871-9390-4F49-9165-FEA19EAEDAD6}" destId="{BD424B58-7C4B-924F-A6D0-29AA3A6E0DA3}" srcOrd="0" destOrd="0" presId="urn:microsoft.com/office/officeart/2005/8/layout/cycle7"/>
+    <dgm:cxn modelId="{882E81BB-6343-E146-8D03-7D4D900BEE25}" type="presOf" srcId="{7D92888A-94E1-874F-99F4-AAD20F52308C}" destId="{FFF6FBD4-145B-5049-B0D0-74F575A69218}" srcOrd="0" destOrd="0" presId="urn:microsoft.com/office/officeart/2005/8/layout/cycle7"/>
+    <dgm:cxn modelId="{E94E874A-CF72-774A-9A18-59603591BC47}" type="presOf" srcId="{46F6E394-227C-DB49-88BB-F8E3A97F298B}" destId="{CA9DF486-C3A0-6A42-AB8B-C73D9E3A417B}" srcOrd="0" destOrd="0" presId="urn:microsoft.com/office/officeart/2005/8/layout/cycle7"/>
+    <dgm:cxn modelId="{87E251B6-3176-6744-A5F7-24B6694E3D1F}" srcId="{C25DA871-9390-4F49-9165-FEA19EAEDAD6}" destId="{5476B833-8A93-7D4E-88B7-4D88C954B19C}" srcOrd="3" destOrd="0" parTransId="{283D7C26-8BB1-D644-92E0-4256CBC8EEAB}" sibTransId="{A66627DC-5498-5B4A-BCA7-0AF0DB67DDD9}"/>
+    <dgm:cxn modelId="{205814AF-D8A1-CB44-9C8C-F63C2543C3FB}" type="presOf" srcId="{C21A54E0-F1A3-3448-91D3-28DB80ADDD60}" destId="{16D2087C-AD30-4D47-8459-3242BC07C7A4}" srcOrd="0" destOrd="0" presId="urn:microsoft.com/office/officeart/2005/8/layout/cycle7"/>
+    <dgm:cxn modelId="{5C33DB29-353F-304C-8DEA-0D7B287B26F3}" srcId="{46F6E394-227C-DB49-88BB-F8E3A97F298B}" destId="{BD4C8A68-C6CD-2F46-BE25-0DAAC161B703}" srcOrd="2" destOrd="0" parTransId="{B681CF90-C456-C145-B3B0-B2DF617594E5}" sibTransId="{A7D1DC22-3B83-DD46-B0C7-C5678672CA70}"/>
+    <dgm:cxn modelId="{7AABBF30-6962-6444-ACDB-94D0F5194570}" type="presOf" srcId="{7D92888A-94E1-874F-99F4-AAD20F52308C}" destId="{02EE73D7-6C71-5C46-B588-F2F53E7CFC1B}" srcOrd="1" destOrd="0" presId="urn:microsoft.com/office/officeart/2005/8/layout/cycle7"/>
+    <dgm:cxn modelId="{F8BA5307-BDD5-7B4A-A178-944674F2524D}" type="presOf" srcId="{02D521BB-9D6E-AE4A-BF01-69904886C38E}" destId="{6077CF13-8F28-954E-8B0C-22AC9F9E93CF}" srcOrd="0" destOrd="0" presId="urn:microsoft.com/office/officeart/2005/8/layout/cycle7"/>
+    <dgm:cxn modelId="{775DFD4A-828C-314C-BD31-D8A36D3683AB}" type="presOf" srcId="{F5594C39-B98E-B645-9950-735BA30F8E8C}" destId="{BD424B58-7C4B-924F-A6D0-29AA3A6E0DA3}" srcOrd="0" destOrd="3" presId="urn:microsoft.com/office/officeart/2005/8/layout/cycle7"/>
+    <dgm:cxn modelId="{066B4F64-A233-F842-836A-5C91E87AA49C}" type="presOf" srcId="{BD4C8A68-C6CD-2F46-BE25-0DAAC161B703}" destId="{CA9DF486-C3A0-6A42-AB8B-C73D9E3A417B}" srcOrd="0" destOrd="3" presId="urn:microsoft.com/office/officeart/2005/8/layout/cycle7"/>
+    <dgm:cxn modelId="{744F02D0-EB56-F541-AF76-A16A50773F4A}" type="presOf" srcId="{A3033D2A-55D9-0240-A10C-D55687930357}" destId="{BD424B58-7C4B-924F-A6D0-29AA3A6E0DA3}" srcOrd="0" destOrd="1" presId="urn:microsoft.com/office/officeart/2005/8/layout/cycle7"/>
+    <dgm:cxn modelId="{FD1FDC2B-AF2B-0748-82EA-FADAEBA6B99A}" type="presOf" srcId="{79501A34-D2BB-9749-83D7-6B7FFC0661F3}" destId="{BD424B58-7C4B-924F-A6D0-29AA3A6E0DA3}" srcOrd="0" destOrd="5" presId="urn:microsoft.com/office/officeart/2005/8/layout/cycle7"/>
+    <dgm:cxn modelId="{E4875718-4359-C847-A266-E0B696ECB966}" srcId="{C21A54E0-F1A3-3448-91D3-28DB80ADDD60}" destId="{90BF0259-B653-D343-B3D9-53B2D661D792}" srcOrd="2" destOrd="0" parTransId="{8DA0D4A6-3720-5247-B09A-22331FBC6501}" sibTransId="{57F34B26-141D-D34D-9B01-C47A69D3BF6C}"/>
     <dgm:cxn modelId="{C3F2C9CE-8571-F646-BB84-704F309E3618}" type="presOf" srcId="{ECAEFA44-4957-DD4E-9EC7-3B8AFFE8F03D}" destId="{16D2087C-AD30-4D47-8459-3242BC07C7A4}" srcOrd="0" destOrd="1" presId="urn:microsoft.com/office/officeart/2005/8/layout/cycle7"/>
     <dgm:cxn modelId="{24CC9B9D-17CF-9F4C-9FAD-70A63AC661CB}" srcId="{F1FDF8C5-3BF1-0148-A830-2AF5FA0F1929}" destId="{C25DA871-9390-4F49-9165-FEA19EAEDAD6}" srcOrd="1" destOrd="0" parTransId="{CAEDE6BE-4DBC-2144-B554-A60FDFCEFC63}" sibTransId="{7D92888A-94E1-874F-99F4-AAD20F52308C}"/>
-    <dgm:cxn modelId="{E94E874A-CF72-774A-9A18-59603591BC47}" type="presOf" srcId="{46F6E394-227C-DB49-88BB-F8E3A97F298B}" destId="{CA9DF486-C3A0-6A42-AB8B-C73D9E3A417B}" srcOrd="0" destOrd="0" presId="urn:microsoft.com/office/officeart/2005/8/layout/cycle7"/>
-    <dgm:cxn modelId="{5C33DB29-353F-304C-8DEA-0D7B287B26F3}" srcId="{46F6E394-227C-DB49-88BB-F8E3A97F298B}" destId="{BD4C8A68-C6CD-2F46-BE25-0DAAC161B703}" srcOrd="2" destOrd="0" parTransId="{B681CF90-C456-C145-B3B0-B2DF617594E5}" sibTransId="{A7D1DC22-3B83-DD46-B0C7-C5678672CA70}"/>
-    <dgm:cxn modelId="{386C516A-E133-7B46-B3B4-681DD3A19749}" type="presOf" srcId="{C25DA871-9390-4F49-9165-FEA19EAEDAD6}" destId="{BD424B58-7C4B-924F-A6D0-29AA3A6E0DA3}" srcOrd="0" destOrd="0" presId="urn:microsoft.com/office/officeart/2005/8/layout/cycle7"/>
-    <dgm:cxn modelId="{882E81BB-6343-E146-8D03-7D4D900BEE25}" type="presOf" srcId="{7D92888A-94E1-874F-99F4-AAD20F52308C}" destId="{FFF6FBD4-145B-5049-B0D0-74F575A69218}" srcOrd="0" destOrd="0" presId="urn:microsoft.com/office/officeart/2005/8/layout/cycle7"/>
-    <dgm:cxn modelId="{87E251B6-3176-6744-A5F7-24B6694E3D1F}" srcId="{C25DA871-9390-4F49-9165-FEA19EAEDAD6}" destId="{5476B833-8A93-7D4E-88B7-4D88C954B19C}" srcOrd="3" destOrd="0" parTransId="{283D7C26-8BB1-D644-92E0-4256CBC8EEAB}" sibTransId="{A66627DC-5498-5B4A-BCA7-0AF0DB67DDD9}"/>
-    <dgm:cxn modelId="{2D771C96-352A-6446-8972-5DA18CD67DC2}" srcId="{C25DA871-9390-4F49-9165-FEA19EAEDAD6}" destId="{F5594C39-B98E-B645-9950-735BA30F8E8C}" srcOrd="2" destOrd="0" parTransId="{C803A8E6-23F6-E142-9AC1-9E66374B726D}" sibTransId="{52A1E060-DAAA-9443-9AEB-C039D6F4E6CB}"/>
-    <dgm:cxn modelId="{D624FB87-6929-B546-A3A7-6B82A6F275FD}" srcId="{C25DA871-9390-4F49-9165-FEA19EAEDAD6}" destId="{A3033D2A-55D9-0240-A10C-D55687930357}" srcOrd="0" destOrd="0" parTransId="{5EF3D1CA-8285-D647-B6EE-FB3346FE218D}" sibTransId="{E91EE832-3B26-8B45-BF45-48D3DFC88AE2}"/>
-    <dgm:cxn modelId="{610941E7-3531-E943-8531-89F033A6464D}" type="presOf" srcId="{82B3FB4D-1A40-2A4F-86A2-EDA5E3E8CA95}" destId="{099C6AC5-F29A-BB4F-AAAE-42B5A3FF3498}" srcOrd="0" destOrd="0" presId="urn:microsoft.com/office/officeart/2005/8/layout/cycle7"/>
+    <dgm:cxn modelId="{77C7A835-51EE-3946-BB97-6FC628AB17BD}" type="presOf" srcId="{40C8740C-D20E-6849-9D81-EE1A7B382A5A}" destId="{CA9DF486-C3A0-6A42-AB8B-C73D9E3A417B}" srcOrd="0" destOrd="1" presId="urn:microsoft.com/office/officeart/2005/8/layout/cycle7"/>
     <dgm:cxn modelId="{88665C7E-2FAD-104F-995A-CF51B66F6C5D}" type="presOf" srcId="{322C1E70-58F0-2444-82B9-2EF93C4E3587}" destId="{16D2087C-AD30-4D47-8459-3242BC07C7A4}" srcOrd="0" destOrd="2" presId="urn:microsoft.com/office/officeart/2005/8/layout/cycle7"/>
-    <dgm:cxn modelId="{E4875718-4359-C847-A266-E0B696ECB966}" srcId="{C21A54E0-F1A3-3448-91D3-28DB80ADDD60}" destId="{90BF0259-B653-D343-B3D9-53B2D661D792}" srcOrd="2" destOrd="0" parTransId="{8DA0D4A6-3720-5247-B09A-22331FBC6501}" sibTransId="{57F34B26-141D-D34D-9B01-C47A69D3BF6C}"/>
-    <dgm:cxn modelId="{439095AF-8136-9C4A-8840-3E77BB3A4278}" srcId="{F1FDF8C5-3BF1-0148-A830-2AF5FA0F1929}" destId="{46F6E394-227C-DB49-88BB-F8E3A97F298B}" srcOrd="0" destOrd="0" parTransId="{952C1203-0623-5042-906A-DBADC6CC783C}" sibTransId="{82B3FB4D-1A40-2A4F-86A2-EDA5E3E8CA95}"/>
-    <dgm:cxn modelId="{BF865890-628E-3745-BE75-FB7EB6118BB3}" srcId="{C25DA871-9390-4F49-9165-FEA19EAEDAD6}" destId="{0F386312-2CC3-7141-84FA-87573BDAF383}" srcOrd="1" destOrd="0" parTransId="{852AE919-DE99-304D-9CEC-CA8EF5B1F0EF}" sibTransId="{824A92D6-B6C4-A441-B04B-9A22A44DDD83}"/>
     <dgm:cxn modelId="{B49D9AFE-55F8-8248-9D10-1D92BA06FE04}" srcId="{C21A54E0-F1A3-3448-91D3-28DB80ADDD60}" destId="{322C1E70-58F0-2444-82B9-2EF93C4E3587}" srcOrd="1" destOrd="0" parTransId="{3DAADC81-F98F-E649-914F-B54F4302D686}" sibTransId="{C468F150-2103-3A41-A4C7-73F5BAE2C496}"/>
     <dgm:cxn modelId="{3F9461E5-C6FC-8D4A-BD18-B3DB586896E8}" srcId="{C25DA871-9390-4F49-9165-FEA19EAEDAD6}" destId="{79501A34-D2BB-9749-83D7-6B7FFC0661F3}" srcOrd="4" destOrd="0" parTransId="{E9E4C34C-2A3C-7D44-BAA3-AAD003DDA5A3}" sibTransId="{F2C57C73-7EFF-A44E-8F00-CA98274044DB}"/>
-    <dgm:cxn modelId="{744F02D0-EB56-F541-AF76-A16A50773F4A}" type="presOf" srcId="{A3033D2A-55D9-0240-A10C-D55687930357}" destId="{BD424B58-7C4B-924F-A6D0-29AA3A6E0DA3}" srcOrd="0" destOrd="1" presId="urn:microsoft.com/office/officeart/2005/8/layout/cycle7"/>
+    <dgm:cxn modelId="{2D771C96-352A-6446-8972-5DA18CD67DC2}" srcId="{C25DA871-9390-4F49-9165-FEA19EAEDAD6}" destId="{F5594C39-B98E-B645-9950-735BA30F8E8C}" srcOrd="2" destOrd="0" parTransId="{C803A8E6-23F6-E142-9AC1-9E66374B726D}" sibTransId="{52A1E060-DAAA-9443-9AEB-C039D6F4E6CB}"/>
     <dgm:cxn modelId="{7123EA1B-E52C-E747-92DE-2075034F2266}" type="presOf" srcId="{F1FDF8C5-3BF1-0148-A830-2AF5FA0F1929}" destId="{F4277413-575A-FD42-A8A0-BE562F49A1F3}" srcOrd="0" destOrd="0" presId="urn:microsoft.com/office/officeart/2005/8/layout/cycle7"/>
-    <dgm:cxn modelId="{F8BA5307-BDD5-7B4A-A178-944674F2524D}" type="presOf" srcId="{02D521BB-9D6E-AE4A-BF01-69904886C38E}" destId="{6077CF13-8F28-954E-8B0C-22AC9F9E93CF}" srcOrd="0" destOrd="0" presId="urn:microsoft.com/office/officeart/2005/8/layout/cycle7"/>
-    <dgm:cxn modelId="{CEB0D67F-B68E-0242-BC49-296A1B46B2DA}" type="presOf" srcId="{82B3FB4D-1A40-2A4F-86A2-EDA5E3E8CA95}" destId="{5D018A5C-7647-7C48-8D70-F2604E096796}" srcOrd="1" destOrd="0" presId="urn:microsoft.com/office/officeart/2005/8/layout/cycle7"/>
-    <dgm:cxn modelId="{9C69C240-398A-9F49-AE2A-8957FABE77F2}" type="presOf" srcId="{916ECD92-7A02-5E4B-ADEB-2918DC3CD55C}" destId="{CA9DF486-C3A0-6A42-AB8B-C73D9E3A417B}" srcOrd="0" destOrd="2" presId="urn:microsoft.com/office/officeart/2005/8/layout/cycle7"/>
-    <dgm:cxn modelId="{EB06170F-F583-3F41-8477-669B6BAA3057}" type="presOf" srcId="{5476B833-8A93-7D4E-88B7-4D88C954B19C}" destId="{BD424B58-7C4B-924F-A6D0-29AA3A6E0DA3}" srcOrd="0" destOrd="4" presId="urn:microsoft.com/office/officeart/2005/8/layout/cycle7"/>
-    <dgm:cxn modelId="{7AABBF30-6962-6444-ACDB-94D0F5194570}" type="presOf" srcId="{7D92888A-94E1-874F-99F4-AAD20F52308C}" destId="{02EE73D7-6C71-5C46-B588-F2F53E7CFC1B}" srcOrd="1" destOrd="0" presId="urn:microsoft.com/office/officeart/2005/8/layout/cycle7"/>
-    <dgm:cxn modelId="{A68F0551-CD66-054E-8101-EC9770A6396E}" srcId="{F1FDF8C5-3BF1-0148-A830-2AF5FA0F1929}" destId="{C21A54E0-F1A3-3448-91D3-28DB80ADDD60}" srcOrd="2" destOrd="0" parTransId="{21FC1A68-250C-E64B-ADB7-890AC9F32CBD}" sibTransId="{02D521BB-9D6E-AE4A-BF01-69904886C38E}"/>
-    <dgm:cxn modelId="{066B4F64-A233-F842-836A-5C91E87AA49C}" type="presOf" srcId="{BD4C8A68-C6CD-2F46-BE25-0DAAC161B703}" destId="{CA9DF486-C3A0-6A42-AB8B-C73D9E3A417B}" srcOrd="0" destOrd="3" presId="urn:microsoft.com/office/officeart/2005/8/layout/cycle7"/>
-    <dgm:cxn modelId="{AE497691-12A0-644B-8A9B-7CD43475B532}" srcId="{46F6E394-227C-DB49-88BB-F8E3A97F298B}" destId="{40C8740C-D20E-6849-9D81-EE1A7B382A5A}" srcOrd="0" destOrd="0" parTransId="{156975FF-FC8F-BC42-907A-0999888B2E6C}" sibTransId="{70719985-FECE-2743-AFD3-F7A0E77DA067}"/>
-    <dgm:cxn modelId="{1BDD6A9D-7B2C-F147-8B93-9690C055E093}" srcId="{C21A54E0-F1A3-3448-91D3-28DB80ADDD60}" destId="{ECAEFA44-4957-DD4E-9EC7-3B8AFFE8F03D}" srcOrd="0" destOrd="0" parTransId="{2E56FF09-6D0A-A548-B846-6B17B91B1D79}" sibTransId="{B98F66F2-62A4-7A4F-A76A-AB5EBDE10157}"/>
-    <dgm:cxn modelId="{4EB942E7-73A7-B64D-92F5-57337AACB3BA}" srcId="{46F6E394-227C-DB49-88BB-F8E3A97F298B}" destId="{916ECD92-7A02-5E4B-ADEB-2918DC3CD55C}" srcOrd="1" destOrd="0" parTransId="{2FDBB221-967C-5E46-B7BA-7BD69CF9306B}" sibTransId="{FB9E940C-20CF-5244-8B00-E91442118B85}"/>
-    <dgm:cxn modelId="{FD1FDC2B-AF2B-0748-82EA-FADAEBA6B99A}" type="presOf" srcId="{79501A34-D2BB-9749-83D7-6B7FFC0661F3}" destId="{BD424B58-7C4B-924F-A6D0-29AA3A6E0DA3}" srcOrd="0" destOrd="5" presId="urn:microsoft.com/office/officeart/2005/8/layout/cycle7"/>
-    <dgm:cxn modelId="{775DFD4A-828C-314C-BD31-D8A36D3683AB}" type="presOf" srcId="{F5594C39-B98E-B645-9950-735BA30F8E8C}" destId="{BD424B58-7C4B-924F-A6D0-29AA3A6E0DA3}" srcOrd="0" destOrd="3" presId="urn:microsoft.com/office/officeart/2005/8/layout/cycle7"/>
-    <dgm:cxn modelId="{C97623DE-A426-FF48-B163-84F9D2DA4F8B}" type="presOf" srcId="{02D521BB-9D6E-AE4A-BF01-69904886C38E}" destId="{00FAAA09-DE32-0E41-8978-A0DCD42450DC}" srcOrd="1" destOrd="0" presId="urn:microsoft.com/office/officeart/2005/8/layout/cycle7"/>
-    <dgm:cxn modelId="{769EAF18-E7FC-EE4F-9381-ECB4F437283B}" type="presOf" srcId="{0F386312-2CC3-7141-84FA-87573BDAF383}" destId="{BD424B58-7C4B-924F-A6D0-29AA3A6E0DA3}" srcOrd="0" destOrd="2" presId="urn:microsoft.com/office/officeart/2005/8/layout/cycle7"/>
-    <dgm:cxn modelId="{205814AF-D8A1-CB44-9C8C-F63C2543C3FB}" type="presOf" srcId="{C21A54E0-F1A3-3448-91D3-28DB80ADDD60}" destId="{16D2087C-AD30-4D47-8459-3242BC07C7A4}" srcOrd="0" destOrd="0" presId="urn:microsoft.com/office/officeart/2005/8/layout/cycle7"/>
     <dgm:cxn modelId="{D26C9AB8-35FF-464C-9800-20513D8C89B5}" type="presParOf" srcId="{F4277413-575A-FD42-A8A0-BE562F49A1F3}" destId="{CA9DF486-C3A0-6A42-AB8B-C73D9E3A417B}" srcOrd="0" destOrd="0" presId="urn:microsoft.com/office/officeart/2005/8/layout/cycle7"/>
     <dgm:cxn modelId="{6000B9B2-EE47-C144-BD1A-39060FC521CA}" type="presParOf" srcId="{F4277413-575A-FD42-A8A0-BE562F49A1F3}" destId="{099C6AC5-F29A-BB4F-AAAE-42B5A3FF3498}" srcOrd="1" destOrd="0" presId="urn:microsoft.com/office/officeart/2005/8/layout/cycle7"/>
     <dgm:cxn modelId="{05DD4B05-E05D-A94B-8433-8826AE0C437A}" type="presParOf" srcId="{099C6AC5-F29A-BB4F-AAAE-42B5A3FF3498}" destId="{5D018A5C-7647-7C48-8D70-F2604E096796}" srcOrd="0" destOrd="0" presId="urn:microsoft.com/office/officeart/2005/8/layout/cycle7"/>
@@ -3632,6 +3677,546 @@
 </dgm:styleDef>
 </file>
 
+<file path=ppt/notesMasters/notesMaster1.xml><?xml version="1.0" encoding="utf-8"?>
+<p:notesMaster xmlns:a="http://schemas.openxmlformats.org/drawingml/2006/main" xmlns:r="http://schemas.openxmlformats.org/officeDocument/2006/relationships" xmlns:p="http://schemas.openxmlformats.org/presentationml/2006/main">
+  <p:cSld>
+    <p:bg>
+      <p:bgRef idx="1001">
+        <a:schemeClr val="bg1"/>
+      </p:bgRef>
+    </p:bg>
+    <p:spTree>
+      <p:nvGrpSpPr>
+        <p:cNvPr id="1" name=""/>
+        <p:cNvGrpSpPr/>
+        <p:nvPr/>
+      </p:nvGrpSpPr>
+      <p:grpSpPr>
+        <a:xfrm>
+          <a:off x="0" y="0"/>
+          <a:ext cx="0" cy="0"/>
+          <a:chOff x="0" y="0"/>
+          <a:chExt cx="0" cy="0"/>
+        </a:xfrm>
+      </p:grpSpPr>
+      <p:sp>
+        <p:nvSpPr>
+          <p:cNvPr id="2" name="Header Placeholder 1"/>
+          <p:cNvSpPr>
+            <a:spLocks noGrp="1"/>
+          </p:cNvSpPr>
+          <p:nvPr>
+            <p:ph type="hdr" sz="quarter"/>
+          </p:nvPr>
+        </p:nvSpPr>
+        <p:spPr>
+          <a:xfrm>
+            <a:off x="0" y="0"/>
+            <a:ext cx="2971800" cy="458788"/>
+          </a:xfrm>
+          <a:prstGeom prst="rect">
+            <a:avLst/>
+          </a:prstGeom>
+        </p:spPr>
+        <p:txBody>
+          <a:bodyPr vert="horz" lIns="91440" tIns="45720" rIns="91440" bIns="45720" rtlCol="0"/>
+          <a:lstStyle>
+            <a:lvl1pPr algn="l">
+              <a:defRPr sz="1200"/>
+            </a:lvl1pPr>
+          </a:lstStyle>
+          <a:p>
+            <a:endParaRPr lang="en-US"/>
+          </a:p>
+        </p:txBody>
+      </p:sp>
+      <p:sp>
+        <p:nvSpPr>
+          <p:cNvPr id="3" name="Date Placeholder 2"/>
+          <p:cNvSpPr>
+            <a:spLocks noGrp="1"/>
+          </p:cNvSpPr>
+          <p:nvPr>
+            <p:ph type="dt" idx="1"/>
+          </p:nvPr>
+        </p:nvSpPr>
+        <p:spPr>
+          <a:xfrm>
+            <a:off x="3884613" y="0"/>
+            <a:ext cx="2971800" cy="458788"/>
+          </a:xfrm>
+          <a:prstGeom prst="rect">
+            <a:avLst/>
+          </a:prstGeom>
+        </p:spPr>
+        <p:txBody>
+          <a:bodyPr vert="horz" lIns="91440" tIns="45720" rIns="91440" bIns="45720" rtlCol="0"/>
+          <a:lstStyle>
+            <a:lvl1pPr algn="r">
+              <a:defRPr sz="1200"/>
+            </a:lvl1pPr>
+          </a:lstStyle>
+          <a:p>
+            <a:fld id="{EE184097-97C1-F24F-87FA-8C9433E02F0D}" type="datetimeFigureOut">
+              <a:rPr lang="en-US" smtClean="0"/>
+              <a:t>12/7/15</a:t>
+            </a:fld>
+            <a:endParaRPr lang="en-US"/>
+          </a:p>
+        </p:txBody>
+      </p:sp>
+      <p:sp>
+        <p:nvSpPr>
+          <p:cNvPr id="4" name="Slide Image Placeholder 3"/>
+          <p:cNvSpPr>
+            <a:spLocks noGrp="1" noRot="1" noChangeAspect="1"/>
+          </p:cNvSpPr>
+          <p:nvPr>
+            <p:ph type="sldImg" idx="2"/>
+          </p:nvPr>
+        </p:nvSpPr>
+        <p:spPr>
+          <a:xfrm>
+            <a:off x="685800" y="1143000"/>
+            <a:ext cx="5486400" cy="3086100"/>
+          </a:xfrm>
+          <a:prstGeom prst="rect">
+            <a:avLst/>
+          </a:prstGeom>
+          <a:noFill/>
+          <a:ln w="12700">
+            <a:solidFill>
+              <a:prstClr val="black"/>
+            </a:solidFill>
+          </a:ln>
+        </p:spPr>
+        <p:txBody>
+          <a:bodyPr vert="horz" lIns="91440" tIns="45720" rIns="91440" bIns="45720" rtlCol="0" anchor="ctr"/>
+          <a:lstStyle/>
+          <a:p>
+            <a:endParaRPr lang="en-US"/>
+          </a:p>
+        </p:txBody>
+      </p:sp>
+      <p:sp>
+        <p:nvSpPr>
+          <p:cNvPr id="5" name="Notes Placeholder 4"/>
+          <p:cNvSpPr>
+            <a:spLocks noGrp="1"/>
+          </p:cNvSpPr>
+          <p:nvPr>
+            <p:ph type="body" sz="quarter" idx="3"/>
+          </p:nvPr>
+        </p:nvSpPr>
+        <p:spPr>
+          <a:xfrm>
+            <a:off x="685800" y="4400550"/>
+            <a:ext cx="5486400" cy="3600450"/>
+          </a:xfrm>
+          <a:prstGeom prst="rect">
+            <a:avLst/>
+          </a:prstGeom>
+        </p:spPr>
+        <p:txBody>
+          <a:bodyPr vert="horz" lIns="91440" tIns="45720" rIns="91440" bIns="45720" rtlCol="0"/>
+          <a:lstStyle/>
+          <a:p>
+            <a:pPr lvl="0"/>
+            <a:r>
+              <a:rPr lang="en-US" smtClean="0"/>
+              <a:t>Click to edit Master text styles</a:t>
+            </a:r>
+          </a:p>
+          <a:p>
+            <a:pPr lvl="1"/>
+            <a:r>
+              <a:rPr lang="en-US" smtClean="0"/>
+              <a:t>Second level</a:t>
+            </a:r>
+          </a:p>
+          <a:p>
+            <a:pPr lvl="2"/>
+            <a:r>
+              <a:rPr lang="en-US" smtClean="0"/>
+              <a:t>Third level</a:t>
+            </a:r>
+          </a:p>
+          <a:p>
+            <a:pPr lvl="3"/>
+            <a:r>
+              <a:rPr lang="en-US" smtClean="0"/>
+              <a:t>Fourth level</a:t>
+            </a:r>
+          </a:p>
+          <a:p>
+            <a:pPr lvl="4"/>
+            <a:r>
+              <a:rPr lang="en-US" smtClean="0"/>
+              <a:t>Fifth level</a:t>
+            </a:r>
+            <a:endParaRPr lang="en-US"/>
+          </a:p>
+        </p:txBody>
+      </p:sp>
+      <p:sp>
+        <p:nvSpPr>
+          <p:cNvPr id="6" name="Footer Placeholder 5"/>
+          <p:cNvSpPr>
+            <a:spLocks noGrp="1"/>
+          </p:cNvSpPr>
+          <p:nvPr>
+            <p:ph type="ftr" sz="quarter" idx="4"/>
+          </p:nvPr>
+        </p:nvSpPr>
+        <p:spPr>
+          <a:xfrm>
+            <a:off x="0" y="8685213"/>
+            <a:ext cx="2971800" cy="458787"/>
+          </a:xfrm>
+          <a:prstGeom prst="rect">
+            <a:avLst/>
+          </a:prstGeom>
+        </p:spPr>
+        <p:txBody>
+          <a:bodyPr vert="horz" lIns="91440" tIns="45720" rIns="91440" bIns="45720" rtlCol="0" anchor="b"/>
+          <a:lstStyle>
+            <a:lvl1pPr algn="l">
+              <a:defRPr sz="1200"/>
+            </a:lvl1pPr>
+          </a:lstStyle>
+          <a:p>
+            <a:endParaRPr lang="en-US"/>
+          </a:p>
+        </p:txBody>
+      </p:sp>
+      <p:sp>
+        <p:nvSpPr>
+          <p:cNvPr id="7" name="Slide Number Placeholder 6"/>
+          <p:cNvSpPr>
+            <a:spLocks noGrp="1"/>
+          </p:cNvSpPr>
+          <p:nvPr>
+            <p:ph type="sldNum" sz="quarter" idx="5"/>
+          </p:nvPr>
+        </p:nvSpPr>
+        <p:spPr>
+          <a:xfrm>
+            <a:off x="3884613" y="8685213"/>
+            <a:ext cx="2971800" cy="458787"/>
+          </a:xfrm>
+          <a:prstGeom prst="rect">
+            <a:avLst/>
+          </a:prstGeom>
+        </p:spPr>
+        <p:txBody>
+          <a:bodyPr vert="horz" lIns="91440" tIns="45720" rIns="91440" bIns="45720" rtlCol="0" anchor="b"/>
+          <a:lstStyle>
+            <a:lvl1pPr algn="r">
+              <a:defRPr sz="1200"/>
+            </a:lvl1pPr>
+          </a:lstStyle>
+          <a:p>
+            <a:fld id="{F95F0DC2-549E-7541-8018-6C1359EE6273}" type="slidenum">
+              <a:rPr lang="en-US" smtClean="0"/>
+              <a:t>‹#›</a:t>
+            </a:fld>
+            <a:endParaRPr lang="en-US"/>
+          </a:p>
+        </p:txBody>
+      </p:sp>
+    </p:spTree>
+    <p:extLst>
+      <p:ext uri="{BB962C8B-B14F-4D97-AF65-F5344CB8AC3E}">
+        <p14:creationId xmlns:p14="http://schemas.microsoft.com/office/powerpoint/2010/main" val="1244007455"/>
+      </p:ext>
+    </p:extLst>
+  </p:cSld>
+  <p:clrMap bg1="lt1" tx1="dk1" bg2="lt2" tx2="dk2" accent1="accent1" accent2="accent2" accent3="accent3" accent4="accent4" accent5="accent5" accent6="accent6" hlink="hlink" folHlink="folHlink"/>
+  <p:notesStyle>
+    <a:lvl1pPr marL="0" algn="l" defTabSz="914400" rtl="0" eaLnBrk="1" latinLnBrk="0" hangingPunct="1">
+      <a:defRPr sz="1200" kern="1200">
+        <a:solidFill>
+          <a:schemeClr val="tx1"/>
+        </a:solidFill>
+        <a:latin typeface="+mn-lt"/>
+        <a:ea typeface="+mn-ea"/>
+        <a:cs typeface="+mn-cs"/>
+      </a:defRPr>
+    </a:lvl1pPr>
+    <a:lvl2pPr marL="457200" algn="l" defTabSz="914400" rtl="0" eaLnBrk="1" latinLnBrk="0" hangingPunct="1">
+      <a:defRPr sz="1200" kern="1200">
+        <a:solidFill>
+          <a:schemeClr val="tx1"/>
+        </a:solidFill>
+        <a:latin typeface="+mn-lt"/>
+        <a:ea typeface="+mn-ea"/>
+        <a:cs typeface="+mn-cs"/>
+      </a:defRPr>
+    </a:lvl2pPr>
+    <a:lvl3pPr marL="914400" algn="l" defTabSz="914400" rtl="0" eaLnBrk="1" latinLnBrk="0" hangingPunct="1">
+      <a:defRPr sz="1200" kern="1200">
+        <a:solidFill>
+          <a:schemeClr val="tx1"/>
+        </a:solidFill>
+        <a:latin typeface="+mn-lt"/>
+        <a:ea typeface="+mn-ea"/>
+        <a:cs typeface="+mn-cs"/>
+      </a:defRPr>
+    </a:lvl3pPr>
+    <a:lvl4pPr marL="1371600" algn="l" defTabSz="914400" rtl="0" eaLnBrk="1" latinLnBrk="0" hangingPunct="1">
+      <a:defRPr sz="1200" kern="1200">
+        <a:solidFill>
+          <a:schemeClr val="tx1"/>
+        </a:solidFill>
+        <a:latin typeface="+mn-lt"/>
+        <a:ea typeface="+mn-ea"/>
+        <a:cs typeface="+mn-cs"/>
+      </a:defRPr>
+    </a:lvl4pPr>
+    <a:lvl5pPr marL="1828800" algn="l" defTabSz="914400" rtl="0" eaLnBrk="1" latinLnBrk="0" hangingPunct="1">
+      <a:defRPr sz="1200" kern="1200">
+        <a:solidFill>
+          <a:schemeClr val="tx1"/>
+        </a:solidFill>
+        <a:latin typeface="+mn-lt"/>
+        <a:ea typeface="+mn-ea"/>
+        <a:cs typeface="+mn-cs"/>
+      </a:defRPr>
+    </a:lvl5pPr>
+    <a:lvl6pPr marL="2286000" algn="l" defTabSz="914400" rtl="0" eaLnBrk="1" latinLnBrk="0" hangingPunct="1">
+      <a:defRPr sz="1200" kern="1200">
+        <a:solidFill>
+          <a:schemeClr val="tx1"/>
+        </a:solidFill>
+        <a:latin typeface="+mn-lt"/>
+        <a:ea typeface="+mn-ea"/>
+        <a:cs typeface="+mn-cs"/>
+      </a:defRPr>
+    </a:lvl6pPr>
+    <a:lvl7pPr marL="2743200" algn="l" defTabSz="914400" rtl="0" eaLnBrk="1" latinLnBrk="0" hangingPunct="1">
+      <a:defRPr sz="1200" kern="1200">
+        <a:solidFill>
+          <a:schemeClr val="tx1"/>
+        </a:solidFill>
+        <a:latin typeface="+mn-lt"/>
+        <a:ea typeface="+mn-ea"/>
+        <a:cs typeface="+mn-cs"/>
+      </a:defRPr>
+    </a:lvl7pPr>
+    <a:lvl8pPr marL="3200400" algn="l" defTabSz="914400" rtl="0" eaLnBrk="1" latinLnBrk="0" hangingPunct="1">
+      <a:defRPr sz="1200" kern="1200">
+        <a:solidFill>
+          <a:schemeClr val="tx1"/>
+        </a:solidFill>
+        <a:latin typeface="+mn-lt"/>
+        <a:ea typeface="+mn-ea"/>
+        <a:cs typeface="+mn-cs"/>
+      </a:defRPr>
+    </a:lvl8pPr>
+    <a:lvl9pPr marL="3657600" algn="l" defTabSz="914400" rtl="0" eaLnBrk="1" latinLnBrk="0" hangingPunct="1">
+      <a:defRPr sz="1200" kern="1200">
+        <a:solidFill>
+          <a:schemeClr val="tx1"/>
+        </a:solidFill>
+        <a:latin typeface="+mn-lt"/>
+        <a:ea typeface="+mn-ea"/>
+        <a:cs typeface="+mn-cs"/>
+      </a:defRPr>
+    </a:lvl9pPr>
+  </p:notesStyle>
+</p:notesMaster>
+</file>
+
+<file path=ppt/notesSlides/notesSlide1.xml><?xml version="1.0" encoding="utf-8"?>
+<p:notes xmlns:a="http://schemas.openxmlformats.org/drawingml/2006/main" xmlns:r="http://schemas.openxmlformats.org/officeDocument/2006/relationships" xmlns:p="http://schemas.openxmlformats.org/presentationml/2006/main">
+  <p:cSld>
+    <p:spTree>
+      <p:nvGrpSpPr>
+        <p:cNvPr id="1" name=""/>
+        <p:cNvGrpSpPr/>
+        <p:nvPr/>
+      </p:nvGrpSpPr>
+      <p:grpSpPr>
+        <a:xfrm>
+          <a:off x="0" y="0"/>
+          <a:ext cx="0" cy="0"/>
+          <a:chOff x="0" y="0"/>
+          <a:chExt cx="0" cy="0"/>
+        </a:xfrm>
+      </p:grpSpPr>
+      <p:sp>
+        <p:nvSpPr>
+          <p:cNvPr id="2" name="Slide Image Placeholder 1"/>
+          <p:cNvSpPr>
+            <a:spLocks noGrp="1" noRot="1" noChangeAspect="1"/>
+          </p:cNvSpPr>
+          <p:nvPr>
+            <p:ph type="sldImg"/>
+          </p:nvPr>
+        </p:nvSpPr>
+        <p:spPr/>
+      </p:sp>
+      <p:sp>
+        <p:nvSpPr>
+          <p:cNvPr id="3" name="Notes Placeholder 2"/>
+          <p:cNvSpPr>
+            <a:spLocks noGrp="1"/>
+          </p:cNvSpPr>
+          <p:nvPr>
+            <p:ph type="body" idx="1"/>
+          </p:nvPr>
+        </p:nvSpPr>
+        <p:spPr/>
+        <p:txBody>
+          <a:bodyPr/>
+          <a:lstStyle/>
+          <a:p>
+            <a:r>
+              <a:rPr lang="en-US" dirty="0" smtClean="0"/>
+              <a:t>Easy to install framework with ruby on rails. Used to create navigation</a:t>
+            </a:r>
+            <a:r>
+              <a:rPr lang="en-US" baseline="0" dirty="0" smtClean="0"/>
+              <a:t> bar, form formatting, and buttons</a:t>
+            </a:r>
+            <a:endParaRPr lang="en-US" dirty="0"/>
+          </a:p>
+        </p:txBody>
+      </p:sp>
+      <p:sp>
+        <p:nvSpPr>
+          <p:cNvPr id="4" name="Slide Number Placeholder 3"/>
+          <p:cNvSpPr>
+            <a:spLocks noGrp="1"/>
+          </p:cNvSpPr>
+          <p:nvPr>
+            <p:ph type="sldNum" sz="quarter" idx="10"/>
+          </p:nvPr>
+        </p:nvSpPr>
+        <p:spPr/>
+        <p:txBody>
+          <a:bodyPr/>
+          <a:lstStyle/>
+          <a:p>
+            <a:fld id="{F95F0DC2-549E-7541-8018-6C1359EE6273}" type="slidenum">
+              <a:rPr lang="en-US" smtClean="0"/>
+              <a:t>5</a:t>
+            </a:fld>
+            <a:endParaRPr lang="en-US"/>
+          </a:p>
+        </p:txBody>
+      </p:sp>
+    </p:spTree>
+    <p:extLst>
+      <p:ext uri="{BB962C8B-B14F-4D97-AF65-F5344CB8AC3E}">
+        <p14:creationId xmlns:p14="http://schemas.microsoft.com/office/powerpoint/2010/main" val="132508993"/>
+      </p:ext>
+    </p:extLst>
+  </p:cSld>
+  <p:clrMapOvr>
+    <a:masterClrMapping/>
+  </p:clrMapOvr>
+</p:notes>
+</file>
+
+<file path=ppt/notesSlides/notesSlide2.xml><?xml version="1.0" encoding="utf-8"?>
+<p:notes xmlns:a="http://schemas.openxmlformats.org/drawingml/2006/main" xmlns:r="http://schemas.openxmlformats.org/officeDocument/2006/relationships" xmlns:p="http://schemas.openxmlformats.org/presentationml/2006/main">
+  <p:cSld>
+    <p:spTree>
+      <p:nvGrpSpPr>
+        <p:cNvPr id="1" name=""/>
+        <p:cNvGrpSpPr/>
+        <p:nvPr/>
+      </p:nvGrpSpPr>
+      <p:grpSpPr>
+        <a:xfrm>
+          <a:off x="0" y="0"/>
+          <a:ext cx="0" cy="0"/>
+          <a:chOff x="0" y="0"/>
+          <a:chExt cx="0" cy="0"/>
+        </a:xfrm>
+      </p:grpSpPr>
+      <p:sp>
+        <p:nvSpPr>
+          <p:cNvPr id="2" name="Slide Image Placeholder 1"/>
+          <p:cNvSpPr>
+            <a:spLocks noGrp="1" noRot="1" noChangeAspect="1"/>
+          </p:cNvSpPr>
+          <p:nvPr>
+            <p:ph type="sldImg"/>
+          </p:nvPr>
+        </p:nvSpPr>
+        <p:spPr/>
+      </p:sp>
+      <p:sp>
+        <p:nvSpPr>
+          <p:cNvPr id="3" name="Notes Placeholder 2"/>
+          <p:cNvSpPr>
+            <a:spLocks noGrp="1"/>
+          </p:cNvSpPr>
+          <p:nvPr>
+            <p:ph type="body" idx="1"/>
+          </p:nvPr>
+        </p:nvSpPr>
+        <p:spPr/>
+        <p:txBody>
+          <a:bodyPr/>
+          <a:lstStyle/>
+          <a:p>
+            <a:r>
+              <a:rPr lang="en-US" dirty="0" smtClean="0"/>
+              <a:t>Easy to install devise with rails. Used to create</a:t>
+            </a:r>
+            <a:r>
+              <a:rPr lang="en-US" baseline="0" dirty="0" smtClean="0"/>
+              <a:t> user model; devise automatically creates user controller and login/signup views</a:t>
+            </a:r>
+          </a:p>
+          <a:p>
+            <a:r>
+              <a:rPr lang="en-US" baseline="0" dirty="0" smtClean="0"/>
+              <a:t>Passwords are encrypted upon sign up and sessions are created to keep use logged in on log in page</a:t>
+            </a:r>
+            <a:endParaRPr lang="en-US" dirty="0"/>
+          </a:p>
+        </p:txBody>
+      </p:sp>
+      <p:sp>
+        <p:nvSpPr>
+          <p:cNvPr id="4" name="Slide Number Placeholder 3"/>
+          <p:cNvSpPr>
+            <a:spLocks noGrp="1"/>
+          </p:cNvSpPr>
+          <p:nvPr>
+            <p:ph type="sldNum" sz="quarter" idx="10"/>
+          </p:nvPr>
+        </p:nvSpPr>
+        <p:spPr/>
+        <p:txBody>
+          <a:bodyPr/>
+          <a:lstStyle/>
+          <a:p>
+            <a:fld id="{F95F0DC2-549E-7541-8018-6C1359EE6273}" type="slidenum">
+              <a:rPr lang="en-US" smtClean="0"/>
+              <a:t>6</a:t>
+            </a:fld>
+            <a:endParaRPr lang="en-US"/>
+          </a:p>
+        </p:txBody>
+      </p:sp>
+    </p:spTree>
+    <p:extLst>
+      <p:ext uri="{BB962C8B-B14F-4D97-AF65-F5344CB8AC3E}">
+        <p14:creationId xmlns:p14="http://schemas.microsoft.com/office/powerpoint/2010/main" val="1547590594"/>
+      </p:ext>
+    </p:extLst>
+  </p:cSld>
+  <p:clrMapOvr>
+    <a:masterClrMapping/>
+  </p:clrMapOvr>
+</p:notes>
+</file>
+
 <file path=ppt/slideLayouts/slideLayout1.xml><?xml version="1.0" encoding="utf-8"?>
 <p:sldLayout xmlns:a="http://schemas.openxmlformats.org/drawingml/2006/main" xmlns:r="http://schemas.openxmlformats.org/officeDocument/2006/relationships" xmlns:p="http://schemas.openxmlformats.org/presentationml/2006/main" type="title" preserve="1">
   <p:cSld name="Title Slide">
@@ -9915,8 +10500,8 @@
         </p:nvSpPr>
         <p:spPr>
           <a:xfrm>
-            <a:off x="5624945" y="1815379"/>
-            <a:ext cx="750526" cy="369332"/>
+            <a:off x="5230794" y="1753033"/>
+            <a:ext cx="5381787" cy="2785378"/>
           </a:xfrm>
           <a:prstGeom prst="rect">
             <a:avLst/>
@@ -9924,46 +10509,80 @@
           <a:noFill/>
         </p:spPr>
         <p:txBody>
-          <a:bodyPr wrap="none" rtlCol="0">
+          <a:bodyPr wrap="square" rtlCol="0">
             <a:spAutoFit/>
           </a:bodyPr>
           <a:lstStyle/>
           <a:p>
             <a:r>
-              <a:rPr lang="en-US" dirty="0" smtClean="0"/>
+              <a:rPr lang="en-US" sz="2500" dirty="0" smtClean="0"/>
               <a:t>Views</a:t>
             </a:r>
-            <a:endParaRPr lang="en-US" dirty="0"/>
-          </a:p>
-        </p:txBody>
-      </p:sp>
-      <p:sp>
-        <p:nvSpPr>
-          <p:cNvPr id="6" name="TextBox 5"/>
-          <p:cNvSpPr txBox="1"/>
-          <p:nvPr/>
-        </p:nvSpPr>
-        <p:spPr>
-          <a:xfrm>
-            <a:off x="5624945" y="2452688"/>
-            <a:ext cx="1144865" cy="369332"/>
-          </a:xfrm>
-          <a:prstGeom prst="rect">
-            <a:avLst/>
-          </a:prstGeom>
-          <a:noFill/>
-        </p:spPr>
-        <p:txBody>
-          <a:bodyPr wrap="none" rtlCol="0">
-            <a:spAutoFit/>
-          </a:bodyPr>
-          <a:lstStyle/>
-          <a:p>
-            <a:r>
-              <a:rPr lang="en-US" dirty="0" smtClean="0"/>
-              <a:t>Controller</a:t>
-            </a:r>
-            <a:endParaRPr lang="en-US" dirty="0"/>
+          </a:p>
+          <a:p>
+            <a:pPr marL="285750" indent="-285750">
+              <a:buFont typeface="Arial" charset="0"/>
+              <a:buChar char="•"/>
+            </a:pPr>
+            <a:r>
+              <a:rPr lang="en-US" sz="2500" dirty="0" smtClean="0"/>
+              <a:t>Sign Up</a:t>
+            </a:r>
+          </a:p>
+          <a:p>
+            <a:pPr marL="285750" indent="-285750">
+              <a:buFont typeface="Arial" charset="0"/>
+              <a:buChar char="•"/>
+            </a:pPr>
+            <a:r>
+              <a:rPr lang="en-US" sz="2500" dirty="0" smtClean="0"/>
+              <a:t>Login</a:t>
+            </a:r>
+          </a:p>
+          <a:p>
+            <a:pPr marL="285750" indent="-285750">
+              <a:buFont typeface="Arial" charset="0"/>
+              <a:buChar char="•"/>
+            </a:pPr>
+            <a:endParaRPr lang="en-US" sz="2500" dirty="0"/>
+          </a:p>
+          <a:p>
+            <a:r>
+              <a:rPr lang="en-US" sz="2500" dirty="0" smtClean="0"/>
+              <a:t>Model</a:t>
+            </a:r>
+          </a:p>
+          <a:p>
+            <a:pPr marL="285750" indent="-285750">
+              <a:buFont typeface="Arial" charset="0"/>
+              <a:buChar char="•"/>
+            </a:pPr>
+            <a:r>
+              <a:rPr lang="en-US" sz="2500" dirty="0" err="1" smtClean="0"/>
+              <a:t>has_many</a:t>
+            </a:r>
+            <a:r>
+              <a:rPr lang="en-US" sz="2500" dirty="0" smtClean="0"/>
+              <a:t> :entries</a:t>
+            </a:r>
+          </a:p>
+          <a:p>
+            <a:pPr marL="285750" indent="-285750">
+              <a:buFont typeface="Arial" charset="0"/>
+              <a:buChar char="•"/>
+            </a:pPr>
+            <a:r>
+              <a:rPr lang="en-US" sz="2500" dirty="0" err="1"/>
+              <a:t>h</a:t>
+            </a:r>
+            <a:r>
+              <a:rPr lang="en-US" sz="2500" dirty="0" err="1" smtClean="0"/>
+              <a:t>as_many</a:t>
+            </a:r>
+            <a:r>
+              <a:rPr lang="en-US" sz="2500" dirty="0" smtClean="0"/>
+              <a:t> :goals</a:t>
+            </a:r>
           </a:p>
         </p:txBody>
       </p:sp>
@@ -10264,14 +10883,14 @@
       </p:graphicFrame>
       <p:sp>
         <p:nvSpPr>
-          <p:cNvPr id="5" name="TextBox 4"/>
+          <p:cNvPr id="7" name="TextBox 6"/>
           <p:cNvSpPr txBox="1"/>
           <p:nvPr/>
         </p:nvSpPr>
         <p:spPr>
           <a:xfrm>
-            <a:off x="5624945" y="1815379"/>
-            <a:ext cx="750526" cy="369332"/>
+            <a:off x="5230794" y="1753033"/>
+            <a:ext cx="5381787" cy="3170099"/>
           </a:xfrm>
           <a:prstGeom prst="rect">
             <a:avLst/>
@@ -10279,46 +10898,87 @@
           <a:noFill/>
         </p:spPr>
         <p:txBody>
-          <a:bodyPr wrap="none" rtlCol="0">
+          <a:bodyPr wrap="square" rtlCol="0">
             <a:spAutoFit/>
           </a:bodyPr>
           <a:lstStyle/>
           <a:p>
             <a:r>
-              <a:rPr lang="en-US" dirty="0" smtClean="0"/>
+              <a:rPr lang="en-US" sz="2500" dirty="0" smtClean="0"/>
               <a:t>Views</a:t>
             </a:r>
-            <a:endParaRPr lang="en-US" dirty="0"/>
-          </a:p>
-        </p:txBody>
-      </p:sp>
-      <p:sp>
-        <p:nvSpPr>
-          <p:cNvPr id="6" name="TextBox 5"/>
-          <p:cNvSpPr txBox="1"/>
-          <p:nvPr/>
-        </p:nvSpPr>
-        <p:spPr>
-          <a:xfrm>
-            <a:off x="5624945" y="2452688"/>
-            <a:ext cx="1144865" cy="369332"/>
-          </a:xfrm>
-          <a:prstGeom prst="rect">
-            <a:avLst/>
-          </a:prstGeom>
-          <a:noFill/>
-        </p:spPr>
-        <p:txBody>
-          <a:bodyPr wrap="none" rtlCol="0">
-            <a:spAutoFit/>
-          </a:bodyPr>
-          <a:lstStyle/>
-          <a:p>
-            <a:r>
-              <a:rPr lang="en-US" dirty="0" smtClean="0"/>
-              <a:t>Controller</a:t>
-            </a:r>
-            <a:endParaRPr lang="en-US" dirty="0"/>
+          </a:p>
+          <a:p>
+            <a:pPr marL="285750" indent="-285750">
+              <a:buFont typeface="Arial" charset="0"/>
+              <a:buChar char="•"/>
+            </a:pPr>
+            <a:r>
+              <a:rPr lang="en-US" sz="2500" dirty="0" smtClean="0"/>
+              <a:t>View All Goals</a:t>
+            </a:r>
+          </a:p>
+          <a:p>
+            <a:pPr marL="285750" indent="-285750">
+              <a:buFont typeface="Arial" charset="0"/>
+              <a:buChar char="•"/>
+            </a:pPr>
+            <a:r>
+              <a:rPr lang="en-US" sz="2500" dirty="0" smtClean="0"/>
+              <a:t>View Single Goal</a:t>
+            </a:r>
+          </a:p>
+          <a:p>
+            <a:pPr marL="285750" indent="-285750">
+              <a:buFont typeface="Arial" charset="0"/>
+              <a:buChar char="•"/>
+            </a:pPr>
+            <a:r>
+              <a:rPr lang="en-US" sz="2500" dirty="0" smtClean="0"/>
+              <a:t>Add Goal</a:t>
+            </a:r>
+          </a:p>
+          <a:p>
+            <a:pPr marL="285750" indent="-285750">
+              <a:buFont typeface="Arial" charset="0"/>
+              <a:buChar char="•"/>
+            </a:pPr>
+            <a:r>
+              <a:rPr lang="en-US" sz="2500" dirty="0" smtClean="0"/>
+              <a:t>Edit Goals</a:t>
+            </a:r>
+            <a:endParaRPr lang="en-US" sz="2500" dirty="0" smtClean="0"/>
+          </a:p>
+          <a:p>
+            <a:pPr marL="285750" indent="-285750">
+              <a:buFont typeface="Arial" charset="0"/>
+              <a:buChar char="•"/>
+            </a:pPr>
+            <a:endParaRPr lang="en-US" sz="2500" dirty="0"/>
+          </a:p>
+          <a:p>
+            <a:r>
+              <a:rPr lang="en-US" sz="2500" dirty="0" smtClean="0"/>
+              <a:t>Model</a:t>
+            </a:r>
+          </a:p>
+          <a:p>
+            <a:pPr marL="285750" indent="-285750">
+              <a:buFont typeface="Arial" charset="0"/>
+              <a:buChar char="•"/>
+            </a:pPr>
+            <a:r>
+              <a:rPr lang="en-US" sz="2500" dirty="0" err="1"/>
+              <a:t>b</a:t>
+            </a:r>
+            <a:r>
+              <a:rPr lang="en-US" sz="2500" dirty="0" err="1" smtClean="0"/>
+              <a:t>elongs_to</a:t>
+            </a:r>
+            <a:r>
+              <a:rPr lang="en-US" sz="2500" dirty="0" smtClean="0"/>
+              <a:t> :user</a:t>
+            </a:r>
           </a:p>
         </p:txBody>
       </p:sp>
@@ -10859,14 +11519,14 @@
       </p:graphicFrame>
       <p:sp>
         <p:nvSpPr>
-          <p:cNvPr id="5" name="TextBox 4"/>
+          <p:cNvPr id="7" name="TextBox 6"/>
           <p:cNvSpPr txBox="1"/>
           <p:nvPr/>
         </p:nvSpPr>
         <p:spPr>
           <a:xfrm>
-            <a:off x="5624945" y="1815379"/>
-            <a:ext cx="750526" cy="369332"/>
+            <a:off x="5230794" y="1753033"/>
+            <a:ext cx="5381787" cy="3554819"/>
           </a:xfrm>
           <a:prstGeom prst="rect">
             <a:avLst/>
@@ -10874,46 +11534,96 @@
           <a:noFill/>
         </p:spPr>
         <p:txBody>
-          <a:bodyPr wrap="none" rtlCol="0">
+          <a:bodyPr wrap="square" rtlCol="0">
             <a:spAutoFit/>
           </a:bodyPr>
           <a:lstStyle/>
           <a:p>
             <a:r>
-              <a:rPr lang="en-US" dirty="0" smtClean="0"/>
+              <a:rPr lang="en-US" sz="2500" dirty="0" smtClean="0"/>
               <a:t>Views</a:t>
             </a:r>
-            <a:endParaRPr lang="en-US" dirty="0"/>
-          </a:p>
-        </p:txBody>
-      </p:sp>
-      <p:sp>
-        <p:nvSpPr>
-          <p:cNvPr id="6" name="TextBox 5"/>
-          <p:cNvSpPr txBox="1"/>
-          <p:nvPr/>
-        </p:nvSpPr>
-        <p:spPr>
-          <a:xfrm>
-            <a:off x="5624945" y="2452688"/>
-            <a:ext cx="1144865" cy="369332"/>
-          </a:xfrm>
-          <a:prstGeom prst="rect">
-            <a:avLst/>
-          </a:prstGeom>
-          <a:noFill/>
-        </p:spPr>
-        <p:txBody>
-          <a:bodyPr wrap="none" rtlCol="0">
-            <a:spAutoFit/>
-          </a:bodyPr>
-          <a:lstStyle/>
-          <a:p>
-            <a:r>
-              <a:rPr lang="en-US" dirty="0" smtClean="0"/>
-              <a:t>Controller</a:t>
-            </a:r>
-            <a:endParaRPr lang="en-US" dirty="0"/>
+          </a:p>
+          <a:p>
+            <a:pPr marL="285750" indent="-285750">
+              <a:buFont typeface="Arial" charset="0"/>
+              <a:buChar char="•"/>
+            </a:pPr>
+            <a:r>
+              <a:rPr lang="en-US" sz="2500" dirty="0" smtClean="0"/>
+              <a:t>View All Entries (on calendar)</a:t>
+            </a:r>
+          </a:p>
+          <a:p>
+            <a:pPr marL="285750" indent="-285750">
+              <a:buFont typeface="Arial" charset="0"/>
+              <a:buChar char="•"/>
+            </a:pPr>
+            <a:r>
+              <a:rPr lang="en-US" sz="2500" dirty="0" smtClean="0"/>
+              <a:t>View Single Entry</a:t>
+            </a:r>
+          </a:p>
+          <a:p>
+            <a:pPr marL="285750" indent="-285750">
+              <a:buFont typeface="Arial" charset="0"/>
+              <a:buChar char="•"/>
+            </a:pPr>
+            <a:r>
+              <a:rPr lang="en-US" sz="2500" dirty="0" smtClean="0"/>
+              <a:t>Add Entry</a:t>
+            </a:r>
+          </a:p>
+          <a:p>
+            <a:pPr marL="285750" indent="-285750">
+              <a:buFont typeface="Arial" charset="0"/>
+              <a:buChar char="•"/>
+            </a:pPr>
+            <a:r>
+              <a:rPr lang="en-US" sz="2500" dirty="0" smtClean="0"/>
+              <a:t>Edit Entry</a:t>
+            </a:r>
+          </a:p>
+          <a:p>
+            <a:pPr marL="285750" indent="-285750">
+              <a:buFont typeface="Arial" charset="0"/>
+              <a:buChar char="•"/>
+            </a:pPr>
+            <a:r>
+              <a:rPr lang="en-US" sz="2500" dirty="0" smtClean="0"/>
+              <a:t>View Progress</a:t>
+            </a:r>
+          </a:p>
+          <a:p>
+            <a:pPr marL="285750" indent="-285750">
+              <a:buFont typeface="Arial" charset="0"/>
+              <a:buChar char="•"/>
+            </a:pPr>
+            <a:endParaRPr lang="en-US" sz="2500" dirty="0"/>
+          </a:p>
+          <a:p>
+            <a:r>
+              <a:rPr lang="en-US" sz="2500" dirty="0" smtClean="0"/>
+              <a:t>Model</a:t>
+            </a:r>
+          </a:p>
+          <a:p>
+            <a:pPr marL="285750" indent="-285750">
+              <a:buFont typeface="Arial" charset="0"/>
+              <a:buChar char="•"/>
+            </a:pPr>
+            <a:r>
+              <a:rPr lang="en-US" sz="2500" dirty="0" err="1"/>
+              <a:t>b</a:t>
+            </a:r>
+            <a:r>
+              <a:rPr lang="en-US" sz="2500" dirty="0" err="1" smtClean="0"/>
+              <a:t>elongs_to</a:t>
+            </a:r>
+            <a:r>
+              <a:rPr lang="en-US" sz="2500" dirty="0" smtClean="0"/>
+              <a:t> :user</a:t>
+            </a:r>
           </a:p>
         </p:txBody>
       </p:sp>
@@ -11660,8 +12370,8 @@
           </a:p>
           <a:p>
             <a:r>
-              <a:rPr lang="en-US" sz="4000" dirty="0" smtClean="0"/>
-              <a:t>Models</a:t>
+              <a:rPr lang="en-US" sz="4000" smtClean="0"/>
+              <a:t>Architecture &amp; Models</a:t>
             </a:r>
             <a:endParaRPr lang="en-US" sz="4000" dirty="0"/>
           </a:p>
@@ -11922,7 +12632,7 @@
           <p:nvPr/>
         </p:nvPicPr>
         <p:blipFill>
-          <a:blip r:embed="rId2">
+          <a:blip r:embed="rId3">
             <a:extLst>
               <a:ext uri="{28A0092B-C50C-407E-A947-70E740481C1C}">
                 <a14:useLocalDpi xmlns:a14="http://schemas.microsoft.com/office/drawing/2010/main" val="0"/>
@@ -11952,7 +12662,7 @@
           <p:nvPr/>
         </p:nvPicPr>
         <p:blipFill>
-          <a:blip r:embed="rId3">
+          <a:blip r:embed="rId4">
             <a:extLst>
               <a:ext uri="{28A0092B-C50C-407E-A947-70E740481C1C}">
                 <a14:useLocalDpi xmlns:a14="http://schemas.microsoft.com/office/drawing/2010/main" val="0"/>
@@ -11982,7 +12692,7 @@
           <p:nvPr/>
         </p:nvPicPr>
         <p:blipFill>
-          <a:blip r:embed="rId4">
+          <a:blip r:embed="rId5">
             <a:extLst>
               <a:ext uri="{28A0092B-C50C-407E-A947-70E740481C1C}">
                 <a14:useLocalDpi xmlns:a14="http://schemas.microsoft.com/office/drawing/2010/main" val="0"/>
@@ -12068,12 +12778,14 @@
         </p:nvSpPr>
         <p:spPr>
           <a:xfrm>
-            <a:off x="1120000" y="1825624"/>
+            <a:off x="1120000" y="1690688"/>
             <a:ext cx="10233800" cy="4665327"/>
           </a:xfrm>
         </p:spPr>
         <p:txBody>
-          <a:bodyPr/>
+          <a:bodyPr>
+            <a:normAutofit/>
+          </a:bodyPr>
           <a:lstStyle/>
           <a:p>
             <a:pPr marL="0" indent="0">
@@ -12109,24 +12821,19 @@
             <a:endParaRPr lang="en-US" dirty="0" smtClean="0"/>
           </a:p>
           <a:p>
+            <a:endParaRPr lang="en-US" dirty="0" smtClean="0"/>
+          </a:p>
+          <a:p>
             <a:r>
               <a:rPr lang="en-US" dirty="0" smtClean="0"/>
-              <a:t>/users/</a:t>
-            </a:r>
-            <a:r>
-              <a:rPr lang="en-US" dirty="0" err="1" smtClean="0"/>
-              <a:t>sign_up</a:t>
+              <a:t>Automatically creates user controller and login/signup views</a:t>
             </a:r>
             <a:endParaRPr lang="en-US" dirty="0"/>
           </a:p>
           <a:p>
             <a:r>
               <a:rPr lang="en-US" dirty="0" smtClean="0"/>
-              <a:t>/users/</a:t>
-            </a:r>
-            <a:r>
-              <a:rPr lang="en-US" dirty="0" err="1" smtClean="0"/>
-              <a:t>sign_in</a:t>
+              <a:t>Password encryption</a:t>
             </a:r>
             <a:endParaRPr lang="en-US" dirty="0" smtClean="0"/>
           </a:p>
@@ -12135,12 +12842,7 @@
               <a:rPr lang="en-US" dirty="0" smtClean="0"/>
               <a:t>Sessions</a:t>
             </a:r>
-          </a:p>
-          <a:p>
-            <a:r>
-              <a:rPr lang="en-US" dirty="0" smtClean="0"/>
-              <a:t>Password encryption</a:t>
-            </a:r>
+            <a:endParaRPr lang="en-US" dirty="0" smtClean="0"/>
           </a:p>
           <a:p>
             <a:endParaRPr lang="en-US" dirty="0" smtClean="0"/>
@@ -12869,4 +13571,265 @@
     </a:ext>
   </a:extLst>
 </a:theme>
+</file>
+
+<file path=ppt/theme/theme2.xml><?xml version="1.0" encoding="utf-8"?>
+<a:theme xmlns:a="http://schemas.openxmlformats.org/drawingml/2006/main" name="Office Theme">
+  <a:themeElements>
+    <a:clrScheme name="Office">
+      <a:dk1>
+        <a:sysClr val="windowText" lastClr="000000"/>
+      </a:dk1>
+      <a:lt1>
+        <a:sysClr val="window" lastClr="FFFFFF"/>
+      </a:lt1>
+      <a:dk2>
+        <a:srgbClr val="44546A"/>
+      </a:dk2>
+      <a:lt2>
+        <a:srgbClr val="E7E6E6"/>
+      </a:lt2>
+      <a:accent1>
+        <a:srgbClr val="5B9BD5"/>
+      </a:accent1>
+      <a:accent2>
+        <a:srgbClr val="ED7D31"/>
+      </a:accent2>
+      <a:accent3>
+        <a:srgbClr val="A5A5A5"/>
+      </a:accent3>
+      <a:accent4>
+        <a:srgbClr val="FFC000"/>
+      </a:accent4>
+      <a:accent5>
+        <a:srgbClr val="4472C4"/>
+      </a:accent5>
+      <a:accent6>
+        <a:srgbClr val="70AD47"/>
+      </a:accent6>
+      <a:hlink>
+        <a:srgbClr val="0563C1"/>
+      </a:hlink>
+      <a:folHlink>
+        <a:srgbClr val="954F72"/>
+      </a:folHlink>
+    </a:clrScheme>
+    <a:fontScheme name="Office">
+      <a:majorFont>
+        <a:latin typeface="Calibri Light" panose="020F0302020204030204"/>
+        <a:ea typeface=""/>
+        <a:cs typeface=""/>
+        <a:font script="Jpan" typeface="Yu Gothic Light"/>
+        <a:font script="Hang" typeface="맑은 고딕"/>
+        <a:font script="Hans" typeface="DengXian Light"/>
+        <a:font script="Hant" typeface="新細明體"/>
+        <a:font script="Arab" typeface="Times New Roman"/>
+        <a:font script="Hebr" typeface="Times New Roman"/>
+        <a:font script="Thai" typeface="Angsana New"/>
+        <a:font script="Ethi" typeface="Nyala"/>
+        <a:font script="Beng" typeface="Vrinda"/>
+        <a:font script="Gujr" typeface="Shruti"/>
+        <a:font script="Khmr" typeface="MoolBoran"/>
+        <a:font script="Knda" typeface="Tunga"/>
+        <a:font script="Guru" typeface="Raavi"/>
+        <a:font script="Cans" typeface="Euphemia"/>
+        <a:font script="Cher" typeface="Plantagenet Cherokee"/>
+        <a:font script="Yiii" typeface="Microsoft Yi Baiti"/>
+        <a:font script="Tibt" typeface="Microsoft Himalaya"/>
+        <a:font script="Thaa" typeface="MV Boli"/>
+        <a:font script="Deva" typeface="Mangal"/>
+        <a:font script="Telu" typeface="Gautami"/>
+        <a:font script="Taml" typeface="Latha"/>
+        <a:font script="Syrc" typeface="Estrangelo Edessa"/>
+        <a:font script="Orya" typeface="Kalinga"/>
+        <a:font script="Mlym" typeface="Kartika"/>
+        <a:font script="Laoo" typeface="DokChampa"/>
+        <a:font script="Sinh" typeface="Iskoola Pota"/>
+        <a:font script="Mong" typeface="Mongolian Baiti"/>
+        <a:font script="Viet" typeface="Times New Roman"/>
+        <a:font script="Uigh" typeface="Microsoft Uighur"/>
+        <a:font script="Geor" typeface="Sylfaen"/>
+      </a:majorFont>
+      <a:minorFont>
+        <a:latin typeface="Calibri" panose="020F0502020204030204"/>
+        <a:ea typeface=""/>
+        <a:cs typeface=""/>
+        <a:font script="Jpan" typeface="Yu Gothic"/>
+        <a:font script="Hang" typeface="맑은 고딕"/>
+        <a:font script="Hans" typeface="DengXian"/>
+        <a:font script="Hant" typeface="新細明體"/>
+        <a:font script="Arab" typeface="Arial"/>
+        <a:font script="Hebr" typeface="Arial"/>
+        <a:font script="Thai" typeface="Cordia New"/>
+        <a:font script="Ethi" typeface="Nyala"/>
+        <a:font script="Beng" typeface="Vrinda"/>
+        <a:font script="Gujr" typeface="Shruti"/>
+        <a:font script="Khmr" typeface="DaunPenh"/>
+        <a:font script="Knda" typeface="Tunga"/>
+        <a:font script="Guru" typeface="Raavi"/>
+        <a:font script="Cans" typeface="Euphemia"/>
+        <a:font script="Cher" typeface="Plantagenet Cherokee"/>
+        <a:font script="Yiii" typeface="Microsoft Yi Baiti"/>
+        <a:font script="Tibt" typeface="Microsoft Himalaya"/>
+        <a:font script="Thaa" typeface="MV Boli"/>
+        <a:font script="Deva" typeface="Mangal"/>
+        <a:font script="Telu" typeface="Gautami"/>
+        <a:font script="Taml" typeface="Latha"/>
+        <a:font script="Syrc" typeface="Estrangelo Edessa"/>
+        <a:font script="Orya" typeface="Kalinga"/>
+        <a:font script="Mlym" typeface="Kartika"/>
+        <a:font script="Laoo" typeface="DokChampa"/>
+        <a:font script="Sinh" typeface="Iskoola Pota"/>
+        <a:font script="Mong" typeface="Mongolian Baiti"/>
+        <a:font script="Viet" typeface="Arial"/>
+        <a:font script="Uigh" typeface="Microsoft Uighur"/>
+        <a:font script="Geor" typeface="Sylfaen"/>
+      </a:minorFont>
+    </a:fontScheme>
+    <a:fmtScheme name="Office">
+      <a:fillStyleLst>
+        <a:solidFill>
+          <a:schemeClr val="phClr"/>
+        </a:solidFill>
+        <a:gradFill rotWithShape="1">
+          <a:gsLst>
+            <a:gs pos="0">
+              <a:schemeClr val="phClr">
+                <a:lumMod val="110000"/>
+                <a:satMod val="105000"/>
+                <a:tint val="67000"/>
+              </a:schemeClr>
+            </a:gs>
+            <a:gs pos="50000">
+              <a:schemeClr val="phClr">
+                <a:lumMod val="105000"/>
+                <a:satMod val="103000"/>
+                <a:tint val="73000"/>
+              </a:schemeClr>
+            </a:gs>
+            <a:gs pos="100000">
+              <a:schemeClr val="phClr">
+                <a:lumMod val="105000"/>
+                <a:satMod val="109000"/>
+                <a:tint val="81000"/>
+              </a:schemeClr>
+            </a:gs>
+          </a:gsLst>
+          <a:lin ang="5400000" scaled="0"/>
+        </a:gradFill>
+        <a:gradFill rotWithShape="1">
+          <a:gsLst>
+            <a:gs pos="0">
+              <a:schemeClr val="phClr">
+                <a:satMod val="103000"/>
+                <a:lumMod val="102000"/>
+                <a:tint val="94000"/>
+              </a:schemeClr>
+            </a:gs>
+            <a:gs pos="50000">
+              <a:schemeClr val="phClr">
+                <a:satMod val="110000"/>
+                <a:lumMod val="100000"/>
+                <a:shade val="100000"/>
+              </a:schemeClr>
+            </a:gs>
+            <a:gs pos="100000">
+              <a:schemeClr val="phClr">
+                <a:lumMod val="99000"/>
+                <a:satMod val="120000"/>
+                <a:shade val="78000"/>
+              </a:schemeClr>
+            </a:gs>
+          </a:gsLst>
+          <a:lin ang="5400000" scaled="0"/>
+        </a:gradFill>
+      </a:fillStyleLst>
+      <a:lnStyleLst>
+        <a:ln w="6350" cap="flat" cmpd="sng" algn="ctr">
+          <a:solidFill>
+            <a:schemeClr val="phClr"/>
+          </a:solidFill>
+          <a:prstDash val="solid"/>
+          <a:miter lim="800000"/>
+        </a:ln>
+        <a:ln w="12700" cap="flat" cmpd="sng" algn="ctr">
+          <a:solidFill>
+            <a:schemeClr val="phClr"/>
+          </a:solidFill>
+          <a:prstDash val="solid"/>
+          <a:miter lim="800000"/>
+        </a:ln>
+        <a:ln w="19050" cap="flat" cmpd="sng" algn="ctr">
+          <a:solidFill>
+            <a:schemeClr val="phClr"/>
+          </a:solidFill>
+          <a:prstDash val="solid"/>
+          <a:miter lim="800000"/>
+        </a:ln>
+      </a:lnStyleLst>
+      <a:effectStyleLst>
+        <a:effectStyle>
+          <a:effectLst/>
+        </a:effectStyle>
+        <a:effectStyle>
+          <a:effectLst/>
+        </a:effectStyle>
+        <a:effectStyle>
+          <a:effectLst>
+            <a:outerShdw blurRad="57150" dist="19050" dir="5400000" algn="ctr" rotWithShape="0">
+              <a:srgbClr val="000000">
+                <a:alpha val="63000"/>
+              </a:srgbClr>
+            </a:outerShdw>
+          </a:effectLst>
+        </a:effectStyle>
+      </a:effectStyleLst>
+      <a:bgFillStyleLst>
+        <a:solidFill>
+          <a:schemeClr val="phClr"/>
+        </a:solidFill>
+        <a:solidFill>
+          <a:schemeClr val="phClr">
+            <a:tint val="95000"/>
+            <a:satMod val="170000"/>
+          </a:schemeClr>
+        </a:solidFill>
+        <a:gradFill rotWithShape="1">
+          <a:gsLst>
+            <a:gs pos="0">
+              <a:schemeClr val="phClr">
+                <a:tint val="93000"/>
+                <a:satMod val="150000"/>
+                <a:shade val="98000"/>
+                <a:lumMod val="102000"/>
+              </a:schemeClr>
+            </a:gs>
+            <a:gs pos="50000">
+              <a:schemeClr val="phClr">
+                <a:tint val="98000"/>
+                <a:satMod val="130000"/>
+                <a:shade val="90000"/>
+                <a:lumMod val="103000"/>
+              </a:schemeClr>
+            </a:gs>
+            <a:gs pos="100000">
+              <a:schemeClr val="phClr">
+                <a:shade val="63000"/>
+                <a:satMod val="120000"/>
+              </a:schemeClr>
+            </a:gs>
+          </a:gsLst>
+          <a:lin ang="5400000" scaled="0"/>
+        </a:gradFill>
+      </a:bgFillStyleLst>
+    </a:fmtScheme>
+  </a:themeElements>
+  <a:objectDefaults/>
+  <a:extraClrSchemeLst/>
+  <a:extLst>
+    <a:ext uri="{05A4C25C-085E-4340-85A3-A5531E510DB2}">
+      <thm15:themeFamily xmlns:thm15="http://schemas.microsoft.com/office/thememl/2012/main" name="Office Theme" id="{62F939B6-93AF-4DB8-9C6B-D6C7DFDC589F}" vid="{4A3C46E8-61CC-4603-A589-7422A47A8E4A}"/>
+    </a:ext>
+  </a:extLst>
+</a:theme>
 </file>
</xml_diff>